<commit_message>
Updated Ashwin's PPT and added Presentation MP4
</commit_message>
<xml_diff>
--- a/Final Presentation Slides/team48finalpresentation_ashwin.pptx
+++ b/Final Presentation Slides/team48finalpresentation_ashwin.pptx
@@ -116,6 +116,98 @@
 </p:presentation>
 </file>
 
+<file path=ppt/revisionInfo.xml><?xml version="1.0" encoding="utf-8"?>
+<p1510:revInfo xmlns:a="http://schemas.openxmlformats.org/drawingml/2006/main" xmlns:r="http://schemas.openxmlformats.org/officeDocument/2006/relationships" xmlns:p1510="http://schemas.microsoft.com/office/powerpoint/2015/10/main">
+  <p1510:revLst>
+    <p1510:client id="{51AB4A30-4B61-4C62-9D66-D18300108DC4}" v="2" dt="2022-11-15T04:13:31.575"/>
+  </p1510:revLst>
+</p1510:revInfo>
+</file>
+
+<file path=ppt/changesInfos/changesInfo1.xml><?xml version="1.0" encoding="utf-8"?>
+<pc:chgInfo xmlns:a="http://schemas.openxmlformats.org/drawingml/2006/main" xmlns:r="http://schemas.openxmlformats.org/officeDocument/2006/relationships" xmlns:ac="http://schemas.microsoft.com/office/drawing/2013/main/command" xmlns:pc="http://schemas.microsoft.com/office/powerpoint/2013/main/command">
+  <pc:docChgLst>
+    <pc:chgData name="Ashwin Spencer" userId="ef4ce729a3f7156c" providerId="LiveId" clId="{51AB4A30-4B61-4C62-9D66-D18300108DC4}"/>
+    <pc:docChg chg="undo custSel modSld">
+      <pc:chgData name="Ashwin Spencer" userId="ef4ce729a3f7156c" providerId="LiveId" clId="{51AB4A30-4B61-4C62-9D66-D18300108DC4}" dt="2022-11-15T02:02:25.572" v="48" actId="14100"/>
+      <pc:docMkLst>
+        <pc:docMk/>
+      </pc:docMkLst>
+      <pc:sldChg chg="addSp delSp mod">
+        <pc:chgData name="Ashwin Spencer" userId="ef4ce729a3f7156c" providerId="LiveId" clId="{51AB4A30-4B61-4C62-9D66-D18300108DC4}" dt="2022-11-15T02:01:02.444" v="46" actId="478"/>
+        <pc:sldMkLst>
+          <pc:docMk/>
+          <pc:sldMk cId="3641339357" sldId="276"/>
+        </pc:sldMkLst>
+        <pc:spChg chg="add del">
+          <ac:chgData name="Ashwin Spencer" userId="ef4ce729a3f7156c" providerId="LiveId" clId="{51AB4A30-4B61-4C62-9D66-D18300108DC4}" dt="2022-11-15T02:01:02.444" v="46" actId="478"/>
+          <ac:spMkLst>
+            <pc:docMk/>
+            <pc:sldMk cId="3641339357" sldId="276"/>
+            <ac:spMk id="3" creationId="{E1FF196A-5164-4C8D-70A1-4FC994F92B62}"/>
+          </ac:spMkLst>
+        </pc:spChg>
+      </pc:sldChg>
+      <pc:sldChg chg="addSp delSp modSp mod">
+        <pc:chgData name="Ashwin Spencer" userId="ef4ce729a3f7156c" providerId="LiveId" clId="{51AB4A30-4B61-4C62-9D66-D18300108DC4}" dt="2022-11-15T02:02:25.572" v="48" actId="14100"/>
+        <pc:sldMkLst>
+          <pc:docMk/>
+          <pc:sldMk cId="1096723522" sldId="277"/>
+        </pc:sldMkLst>
+        <pc:spChg chg="del mod">
+          <ac:chgData name="Ashwin Spencer" userId="ef4ce729a3f7156c" providerId="LiveId" clId="{51AB4A30-4B61-4C62-9D66-D18300108DC4}" dt="2022-11-15T00:40:39.712" v="10" actId="478"/>
+          <ac:spMkLst>
+            <pc:docMk/>
+            <pc:sldMk cId="1096723522" sldId="277"/>
+            <ac:spMk id="18" creationId="{7D78AFA8-BBD0-F351-7F62-D20C6C4C57F4}"/>
+          </ac:spMkLst>
+        </pc:spChg>
+        <pc:spChg chg="del">
+          <ac:chgData name="Ashwin Spencer" userId="ef4ce729a3f7156c" providerId="LiveId" clId="{51AB4A30-4B61-4C62-9D66-D18300108DC4}" dt="2022-11-15T00:03:20.191" v="1" actId="478"/>
+          <ac:spMkLst>
+            <pc:docMk/>
+            <pc:sldMk cId="1096723522" sldId="277"/>
+            <ac:spMk id="19" creationId="{92E08F16-3A5D-3E72-62A5-C01221667805}"/>
+          </ac:spMkLst>
+        </pc:spChg>
+        <pc:graphicFrameChg chg="del mod">
+          <ac:chgData name="Ashwin Spencer" userId="ef4ce729a3f7156c" providerId="LiveId" clId="{51AB4A30-4B61-4C62-9D66-D18300108DC4}" dt="2022-11-15T01:59:48.295" v="12" actId="478"/>
+          <ac:graphicFrameMkLst>
+            <pc:docMk/>
+            <pc:sldMk cId="1096723522" sldId="277"/>
+            <ac:graphicFrameMk id="14" creationId="{0677A040-B0F2-9B5D-C80B-9545770760BC}"/>
+          </ac:graphicFrameMkLst>
+        </pc:graphicFrameChg>
+        <pc:graphicFrameChg chg="add mod modGraphic">
+          <ac:chgData name="Ashwin Spencer" userId="ef4ce729a3f7156c" providerId="LiveId" clId="{51AB4A30-4B61-4C62-9D66-D18300108DC4}" dt="2022-11-15T02:00:42.717" v="43" actId="1038"/>
+          <ac:graphicFrameMkLst>
+            <pc:docMk/>
+            <pc:sldMk cId="1096723522" sldId="277"/>
+            <ac:graphicFrameMk id="22" creationId="{762388D4-9617-2404-AFA9-32E4BB22E9AA}"/>
+          </ac:graphicFrameMkLst>
+        </pc:graphicFrameChg>
+        <pc:picChg chg="add del">
+          <ac:chgData name="Ashwin Spencer" userId="ef4ce729a3f7156c" providerId="LiveId" clId="{51AB4A30-4B61-4C62-9D66-D18300108DC4}" dt="2022-11-15T00:40:11.861" v="4" actId="478"/>
+          <ac:picMkLst>
+            <pc:docMk/>
+            <pc:sldMk cId="1096723522" sldId="277"/>
+            <ac:picMk id="16" creationId="{D1E4C429-2031-B990-5FFD-3A4996551404}"/>
+          </ac:picMkLst>
+        </pc:picChg>
+        <pc:picChg chg="add mod">
+          <ac:chgData name="Ashwin Spencer" userId="ef4ce729a3f7156c" providerId="LiveId" clId="{51AB4A30-4B61-4C62-9D66-D18300108DC4}" dt="2022-11-15T02:02:25.572" v="48" actId="14100"/>
+          <ac:picMkLst>
+            <pc:docMk/>
+            <pc:sldMk cId="1096723522" sldId="277"/>
+            <ac:picMk id="21" creationId="{D21E7A08-CC94-0A67-FE52-96B91497A4DC}"/>
+          </ac:picMkLst>
+        </pc:picChg>
+      </pc:sldChg>
+    </pc:docChg>
+  </pc:docChgLst>
+</pc:chgInfo>
+</file>
+
 <file path=ppt/notesMasters/notesMaster1.xml><?xml version="1.0" encoding="utf-8"?>
 <p:notesMaster xmlns:a="http://schemas.openxmlformats.org/drawingml/2006/main" xmlns:r="http://schemas.openxmlformats.org/officeDocument/2006/relationships" xmlns:p="http://schemas.openxmlformats.org/presentationml/2006/main">
   <p:cSld>
@@ -198,7 +290,7 @@
           <a:p>
             <a:fld id="{D854E5A2-560F-5042-B033-2870576C7FEE}" type="datetimeFigureOut">
               <a:rPr lang="en-US" smtClean="0"/>
-              <a:t>11/13/22</a:t>
+              <a:t>11/14/2022</a:t>
             </a:fld>
             <a:endParaRPr lang="en-US"/>
           </a:p>
@@ -612,7 +704,7 @@
           <a:p>
             <a:fld id="{9893EBB2-0F16-174A-81ED-0C7E96A52E91}" type="datetimeFigureOut">
               <a:rPr lang="en-US" smtClean="0"/>
-              <a:t>11/13/22</a:t>
+              <a:t>11/14/2022</a:t>
             </a:fld>
             <a:endParaRPr lang="en-US"/>
           </a:p>
@@ -810,7 +902,7 @@
           <a:p>
             <a:fld id="{9893EBB2-0F16-174A-81ED-0C7E96A52E91}" type="datetimeFigureOut">
               <a:rPr lang="en-US" smtClean="0"/>
-              <a:t>11/13/22</a:t>
+              <a:t>11/14/2022</a:t>
             </a:fld>
             <a:endParaRPr lang="en-US"/>
           </a:p>
@@ -1018,7 +1110,7 @@
           <a:p>
             <a:fld id="{9893EBB2-0F16-174A-81ED-0C7E96A52E91}" type="datetimeFigureOut">
               <a:rPr lang="en-US" smtClean="0"/>
-              <a:t>11/13/22</a:t>
+              <a:t>11/14/2022</a:t>
             </a:fld>
             <a:endParaRPr lang="en-US"/>
           </a:p>
@@ -1271,7 +1363,7 @@
           <a:p>
             <a:fld id="{9893EBB2-0F16-174A-81ED-0C7E96A52E91}" type="datetimeFigureOut">
               <a:rPr lang="en-US" smtClean="0"/>
-              <a:t>11/13/22</a:t>
+              <a:t>11/14/2022</a:t>
             </a:fld>
             <a:endParaRPr lang="en-US"/>
           </a:p>
@@ -1546,7 +1638,7 @@
           <a:p>
             <a:fld id="{9893EBB2-0F16-174A-81ED-0C7E96A52E91}" type="datetimeFigureOut">
               <a:rPr lang="en-US" smtClean="0"/>
-              <a:t>11/13/22</a:t>
+              <a:t>11/14/2022</a:t>
             </a:fld>
             <a:endParaRPr lang="en-US"/>
           </a:p>
@@ -1866,7 +1958,7 @@
           <a:p>
             <a:fld id="{9893EBB2-0F16-174A-81ED-0C7E96A52E91}" type="datetimeFigureOut">
               <a:rPr lang="en-US" smtClean="0"/>
-              <a:t>11/13/22</a:t>
+              <a:t>11/14/2022</a:t>
             </a:fld>
             <a:endParaRPr lang="en-US"/>
           </a:p>
@@ -2278,7 +2370,7 @@
           <a:p>
             <a:fld id="{9893EBB2-0F16-174A-81ED-0C7E96A52E91}" type="datetimeFigureOut">
               <a:rPr lang="en-US" smtClean="0"/>
-              <a:t>11/13/22</a:t>
+              <a:t>11/14/2022</a:t>
             </a:fld>
             <a:endParaRPr lang="en-US"/>
           </a:p>
@@ -2419,7 +2511,7 @@
           <a:p>
             <a:fld id="{9893EBB2-0F16-174A-81ED-0C7E96A52E91}" type="datetimeFigureOut">
               <a:rPr lang="en-US" smtClean="0"/>
-              <a:t>11/13/22</a:t>
+              <a:t>11/14/2022</a:t>
             </a:fld>
             <a:endParaRPr lang="en-US"/>
           </a:p>
@@ -2532,7 +2624,7 @@
           <a:p>
             <a:fld id="{9893EBB2-0F16-174A-81ED-0C7E96A52E91}" type="datetimeFigureOut">
               <a:rPr lang="en-US" smtClean="0"/>
-              <a:t>11/13/22</a:t>
+              <a:t>11/14/2022</a:t>
             </a:fld>
             <a:endParaRPr lang="en-US"/>
           </a:p>
@@ -2843,7 +2935,7 @@
           <a:p>
             <a:fld id="{9893EBB2-0F16-174A-81ED-0C7E96A52E91}" type="datetimeFigureOut">
               <a:rPr lang="en-US" smtClean="0"/>
-              <a:t>11/13/22</a:t>
+              <a:t>11/14/2022</a:t>
             </a:fld>
             <a:endParaRPr lang="en-US"/>
           </a:p>
@@ -3131,7 +3223,7 @@
           <a:p>
             <a:fld id="{9893EBB2-0F16-174A-81ED-0C7E96A52E91}" type="datetimeFigureOut">
               <a:rPr lang="en-US" smtClean="0"/>
-              <a:t>11/13/22</a:t>
+              <a:t>11/14/2022</a:t>
             </a:fld>
             <a:endParaRPr lang="en-US"/>
           </a:p>
@@ -3372,7 +3464,7 @@
           <a:p>
             <a:fld id="{9893EBB2-0F16-174A-81ED-0C7E96A52E91}" type="datetimeFigureOut">
               <a:rPr lang="en-US" smtClean="0"/>
-              <a:t>11/13/22</a:t>
+              <a:t>11/14/2022</a:t>
             </a:fld>
             <a:endParaRPr lang="en-US"/>
           </a:p>
@@ -5161,25 +5253,7 @@
                   <a:ea typeface="MS Mincho" panose="02020609040205080304" pitchFamily="49" charset="-128"/>
                   <a:cs typeface="Times New Roman" panose="02020603050405020304" pitchFamily="18" charset="0"/>
                 </a:rPr>
-                <a:t>nvestigated feature/DV relationships using </a:t>
-              </a:r>
-              <a:r>
-                <a:rPr lang="en-US" sz="1800" kern="1200" dirty="0" err="1">
-                  <a:effectLst/>
-                  <a:latin typeface="Calibri" panose="020F0502020204030204" pitchFamily="34" charset="0"/>
-                  <a:ea typeface="MS Mincho" panose="02020609040205080304" pitchFamily="49" charset="-128"/>
-                  <a:cs typeface="Times New Roman" panose="02020603050405020304" pitchFamily="18" charset="0"/>
-                </a:rPr>
-                <a:t>pairplots</a:t>
-              </a:r>
-              <a:r>
-                <a:rPr lang="en-US" sz="1800" kern="1200" dirty="0">
-                  <a:effectLst/>
-                  <a:latin typeface="Calibri" panose="020F0502020204030204" pitchFamily="34" charset="0"/>
-                  <a:ea typeface="MS Mincho" panose="02020609040205080304" pitchFamily="49" charset="-128"/>
-                  <a:cs typeface="Times New Roman" panose="02020603050405020304" pitchFamily="18" charset="0"/>
-                </a:rPr>
-                <a:t> and correlation, forming hypotheses about which features would provide the most value to the model</a:t>
+                <a:t>nvestigated feature/DV relationships using pairplots and correlation, forming hypotheses about which features would provide the most value to the model</a:t>
               </a:r>
               <a:endParaRPr lang="en-US" sz="1800" kern="1200" dirty="0"/>
             </a:p>
@@ -5968,1991 +6042,6 @@
           </a:p>
         </p:txBody>
       </p:sp>
-      <p:graphicFrame>
-        <p:nvGraphicFramePr>
-          <p:cNvPr id="14" name="Table 13">
-            <a:extLst>
-              <a:ext uri="{FF2B5EF4-FFF2-40B4-BE49-F238E27FC236}">
-                <a16:creationId xmlns:a16="http://schemas.microsoft.com/office/drawing/2014/main" id="{0677A040-B0F2-9B5D-C80B-9545770760BC}"/>
-              </a:ext>
-            </a:extLst>
-          </p:cNvPr>
-          <p:cNvGraphicFramePr>
-            <a:graphicFrameLocks noGrp="1"/>
-          </p:cNvGraphicFramePr>
-          <p:nvPr>
-            <p:extLst>
-              <p:ext uri="{D42A27DB-BD31-4B8C-83A1-F6EECF244321}">
-                <p14:modId xmlns:p14="http://schemas.microsoft.com/office/powerpoint/2010/main" val="3121977674"/>
-              </p:ext>
-            </p:extLst>
-          </p:nvPr>
-        </p:nvGraphicFramePr>
-        <p:xfrm>
-          <a:off x="4674114" y="1842555"/>
-          <a:ext cx="2894330" cy="2235200"/>
-        </p:xfrm>
-        <a:graphic>
-          <a:graphicData uri="http://schemas.openxmlformats.org/drawingml/2006/table">
-            <a:tbl>
-              <a:tblPr firstRow="1" firstCol="1" bandRow="1">
-                <a:tableStyleId>{5C22544A-7EE6-4342-B048-85BDC9FD1C3A}</a:tableStyleId>
-              </a:tblPr>
-              <a:tblGrid>
-                <a:gridCol w="1446530">
-                  <a:extLst>
-                    <a:ext uri="{9D8B030D-6E8A-4147-A177-3AD203B41FA5}">
-                      <a16:colId xmlns:a16="http://schemas.microsoft.com/office/drawing/2014/main" val="1953781939"/>
-                    </a:ext>
-                  </a:extLst>
-                </a:gridCol>
-                <a:gridCol w="1447800">
-                  <a:extLst>
-                    <a:ext uri="{9D8B030D-6E8A-4147-A177-3AD203B41FA5}">
-                      <a16:colId xmlns:a16="http://schemas.microsoft.com/office/drawing/2014/main" val="181755273"/>
-                    </a:ext>
-                  </a:extLst>
-                </a:gridCol>
-              </a:tblGrid>
-              <a:tr h="203200">
-                <a:tc>
-                  <a:txBody>
-                    <a:bodyPr/>
-                    <a:lstStyle/>
-                    <a:p>
-                      <a:pPr marL="0" marR="0" algn="ctr">
-                        <a:lnSpc>
-                          <a:spcPct val="107000"/>
-                        </a:lnSpc>
-                        <a:spcBef>
-                          <a:spcPts val="0"/>
-                        </a:spcBef>
-                        <a:spcAft>
-                          <a:spcPts val="0"/>
-                        </a:spcAft>
-                      </a:pPr>
-                      <a:r>
-                        <a:rPr lang="en-US" sz="1100" dirty="0">
-                          <a:solidFill>
-                            <a:schemeClr val="tx1"/>
-                          </a:solidFill>
-                          <a:effectLst/>
-                        </a:rPr>
-                        <a:t>Feature</a:t>
-                      </a:r>
-                      <a:endParaRPr lang="en-US" sz="1100" dirty="0">
-                        <a:solidFill>
-                          <a:schemeClr val="tx1"/>
-                        </a:solidFill>
-                        <a:effectLst/>
-                        <a:latin typeface="Calibri" panose="020F0502020204030204" pitchFamily="34" charset="0"/>
-                        <a:ea typeface="Calibri" panose="020F0502020204030204" pitchFamily="34" charset="0"/>
-                        <a:cs typeface="Times New Roman" panose="02020603050405020304" pitchFamily="18" charset="0"/>
-                      </a:endParaRPr>
-                    </a:p>
-                  </a:txBody>
-                  <a:tcPr marL="68580" marR="68580" marT="0" marB="0" anchor="ctr">
-                    <a:lnL w="12700" cap="flat" cmpd="sng" algn="ctr">
-                      <a:solidFill>
-                        <a:schemeClr val="tx1"/>
-                      </a:solidFill>
-                      <a:prstDash val="solid"/>
-                      <a:round/>
-                      <a:headEnd type="none" w="med" len="med"/>
-                      <a:tailEnd type="none" w="med" len="med"/>
-                    </a:lnL>
-                    <a:lnR w="12700" cap="flat" cmpd="sng" algn="ctr">
-                      <a:solidFill>
-                        <a:schemeClr val="tx1"/>
-                      </a:solidFill>
-                      <a:prstDash val="solid"/>
-                      <a:round/>
-                      <a:headEnd type="none" w="med" len="med"/>
-                      <a:tailEnd type="none" w="med" len="med"/>
-                    </a:lnR>
-                    <a:lnT w="12700" cap="flat" cmpd="sng" algn="ctr">
-                      <a:solidFill>
-                        <a:schemeClr val="tx1"/>
-                      </a:solidFill>
-                      <a:prstDash val="solid"/>
-                      <a:round/>
-                      <a:headEnd type="none" w="med" len="med"/>
-                      <a:tailEnd type="none" w="med" len="med"/>
-                    </a:lnT>
-                    <a:lnB w="12700" cap="flat" cmpd="sng" algn="ctr">
-                      <a:solidFill>
-                        <a:schemeClr val="tx1"/>
-                      </a:solidFill>
-                      <a:prstDash val="solid"/>
-                      <a:round/>
-                      <a:headEnd type="none" w="med" len="med"/>
-                      <a:tailEnd type="none" w="med" len="med"/>
-                    </a:lnB>
-                    <a:lnTlToBr w="12700" cmpd="sng">
-                      <a:noFill/>
-                      <a:prstDash val="solid"/>
-                    </a:lnTlToBr>
-                    <a:lnBlToTr w="12700" cmpd="sng">
-                      <a:noFill/>
-                      <a:prstDash val="solid"/>
-                    </a:lnBlToTr>
-                    <a:solidFill>
-                      <a:schemeClr val="accent1">
-                        <a:lumMod val="20000"/>
-                        <a:lumOff val="80000"/>
-                      </a:schemeClr>
-                    </a:solidFill>
-                  </a:tcPr>
-                </a:tc>
-                <a:tc>
-                  <a:txBody>
-                    <a:bodyPr/>
-                    <a:lstStyle/>
-                    <a:p>
-                      <a:pPr marL="0" marR="0" algn="ctr">
-                        <a:lnSpc>
-                          <a:spcPct val="107000"/>
-                        </a:lnSpc>
-                        <a:spcBef>
-                          <a:spcPts val="0"/>
-                        </a:spcBef>
-                        <a:spcAft>
-                          <a:spcPts val="0"/>
-                        </a:spcAft>
-                      </a:pPr>
-                      <a:r>
-                        <a:rPr lang="en-US" sz="1100" dirty="0">
-                          <a:solidFill>
-                            <a:schemeClr val="tx1"/>
-                          </a:solidFill>
-                          <a:effectLst/>
-                        </a:rPr>
-                        <a:t>Correlation with Price</a:t>
-                      </a:r>
-                      <a:endParaRPr lang="en-US" sz="1100" dirty="0">
-                        <a:solidFill>
-                          <a:schemeClr val="tx1"/>
-                        </a:solidFill>
-                        <a:effectLst/>
-                        <a:latin typeface="Calibri" panose="020F0502020204030204" pitchFamily="34" charset="0"/>
-                        <a:ea typeface="Calibri" panose="020F0502020204030204" pitchFamily="34" charset="0"/>
-                        <a:cs typeface="Times New Roman" panose="02020603050405020304" pitchFamily="18" charset="0"/>
-                      </a:endParaRPr>
-                    </a:p>
-                  </a:txBody>
-                  <a:tcPr marL="68580" marR="68580" marT="0" marB="0" anchor="ctr">
-                    <a:lnL w="12700" cap="flat" cmpd="sng" algn="ctr">
-                      <a:solidFill>
-                        <a:schemeClr val="tx1"/>
-                      </a:solidFill>
-                      <a:prstDash val="solid"/>
-                      <a:round/>
-                      <a:headEnd type="none" w="med" len="med"/>
-                      <a:tailEnd type="none" w="med" len="med"/>
-                    </a:lnL>
-                    <a:lnR w="12700" cap="flat" cmpd="sng" algn="ctr">
-                      <a:solidFill>
-                        <a:schemeClr val="tx1"/>
-                      </a:solidFill>
-                      <a:prstDash val="solid"/>
-                      <a:round/>
-                      <a:headEnd type="none" w="med" len="med"/>
-                      <a:tailEnd type="none" w="med" len="med"/>
-                    </a:lnR>
-                    <a:lnT w="12700" cap="flat" cmpd="sng" algn="ctr">
-                      <a:solidFill>
-                        <a:schemeClr val="tx1"/>
-                      </a:solidFill>
-                      <a:prstDash val="solid"/>
-                      <a:round/>
-                      <a:headEnd type="none" w="med" len="med"/>
-                      <a:tailEnd type="none" w="med" len="med"/>
-                    </a:lnT>
-                    <a:lnB w="12700" cap="flat" cmpd="sng" algn="ctr">
-                      <a:solidFill>
-                        <a:schemeClr val="tx1"/>
-                      </a:solidFill>
-                      <a:prstDash val="solid"/>
-                      <a:round/>
-                      <a:headEnd type="none" w="med" len="med"/>
-                      <a:tailEnd type="none" w="med" len="med"/>
-                    </a:lnB>
-                    <a:lnTlToBr w="12700" cmpd="sng">
-                      <a:noFill/>
-                      <a:prstDash val="solid"/>
-                    </a:lnTlToBr>
-                    <a:lnBlToTr w="12700" cmpd="sng">
-                      <a:noFill/>
-                      <a:prstDash val="solid"/>
-                    </a:lnBlToTr>
-                    <a:solidFill>
-                      <a:schemeClr val="accent1">
-                        <a:lumMod val="20000"/>
-                        <a:lumOff val="80000"/>
-                      </a:schemeClr>
-                    </a:solidFill>
-                  </a:tcPr>
-                </a:tc>
-                <a:extLst>
-                  <a:ext uri="{0D108BD9-81ED-4DB2-BD59-A6C34878D82A}">
-                    <a16:rowId xmlns:a16="http://schemas.microsoft.com/office/drawing/2014/main" val="2514803954"/>
-                  </a:ext>
-                </a:extLst>
-              </a:tr>
-              <a:tr h="203200">
-                <a:tc>
-                  <a:txBody>
-                    <a:bodyPr/>
-                    <a:lstStyle/>
-                    <a:p>
-                      <a:pPr marL="0" marR="0">
-                        <a:lnSpc>
-                          <a:spcPct val="107000"/>
-                        </a:lnSpc>
-                        <a:spcBef>
-                          <a:spcPts val="0"/>
-                        </a:spcBef>
-                        <a:spcAft>
-                          <a:spcPts val="0"/>
-                        </a:spcAft>
-                      </a:pPr>
-                      <a:r>
-                        <a:rPr lang="en-US" sz="1100" dirty="0" err="1">
-                          <a:solidFill>
-                            <a:schemeClr val="tx1"/>
-                          </a:solidFill>
-                          <a:effectLst/>
-                        </a:rPr>
-                        <a:t>total_credit_amt</a:t>
-                      </a:r>
-                      <a:endParaRPr lang="en-US" sz="1100" dirty="0">
-                        <a:solidFill>
-                          <a:schemeClr val="tx1"/>
-                        </a:solidFill>
-                        <a:effectLst/>
-                        <a:latin typeface="Calibri" panose="020F0502020204030204" pitchFamily="34" charset="0"/>
-                        <a:ea typeface="Calibri" panose="020F0502020204030204" pitchFamily="34" charset="0"/>
-                        <a:cs typeface="Times New Roman" panose="02020603050405020304" pitchFamily="18" charset="0"/>
-                      </a:endParaRPr>
-                    </a:p>
-                  </a:txBody>
-                  <a:tcPr marL="68580" marR="68580" marT="0" marB="0" anchor="ctr">
-                    <a:lnL w="12700" cap="flat" cmpd="sng" algn="ctr">
-                      <a:solidFill>
-                        <a:schemeClr val="tx1"/>
-                      </a:solidFill>
-                      <a:prstDash val="solid"/>
-                      <a:round/>
-                      <a:headEnd type="none" w="med" len="med"/>
-                      <a:tailEnd type="none" w="med" len="med"/>
-                    </a:lnL>
-                    <a:lnR w="12700" cap="flat" cmpd="sng" algn="ctr">
-                      <a:solidFill>
-                        <a:schemeClr val="tx1"/>
-                      </a:solidFill>
-                      <a:prstDash val="solid"/>
-                      <a:round/>
-                      <a:headEnd type="none" w="med" len="med"/>
-                      <a:tailEnd type="none" w="med" len="med"/>
-                    </a:lnR>
-                    <a:lnT w="12700" cap="flat" cmpd="sng" algn="ctr">
-                      <a:solidFill>
-                        <a:schemeClr val="tx1"/>
-                      </a:solidFill>
-                      <a:prstDash val="solid"/>
-                      <a:round/>
-                      <a:headEnd type="none" w="med" len="med"/>
-                      <a:tailEnd type="none" w="med" len="med"/>
-                    </a:lnT>
-                    <a:lnB w="12700" cap="flat" cmpd="sng" algn="ctr">
-                      <a:solidFill>
-                        <a:schemeClr val="tx1"/>
-                      </a:solidFill>
-                      <a:prstDash val="sysDot"/>
-                      <a:round/>
-                      <a:headEnd type="none" w="med" len="med"/>
-                      <a:tailEnd type="none" w="med" len="med"/>
-                    </a:lnB>
-                    <a:lnTlToBr w="12700" cmpd="sng">
-                      <a:noFill/>
-                      <a:prstDash val="solid"/>
-                    </a:lnTlToBr>
-                    <a:lnBlToTr w="12700" cmpd="sng">
-                      <a:noFill/>
-                      <a:prstDash val="solid"/>
-                    </a:lnBlToTr>
-                    <a:noFill/>
-                  </a:tcPr>
-                </a:tc>
-                <a:tc>
-                  <a:txBody>
-                    <a:bodyPr/>
-                    <a:lstStyle/>
-                    <a:p>
-                      <a:pPr marL="0" marR="0">
-                        <a:lnSpc>
-                          <a:spcPct val="107000"/>
-                        </a:lnSpc>
-                        <a:spcBef>
-                          <a:spcPts val="0"/>
-                        </a:spcBef>
-                        <a:spcAft>
-                          <a:spcPts val="0"/>
-                        </a:spcAft>
-                      </a:pPr>
-                      <a:r>
-                        <a:rPr lang="en-US" sz="1100">
-                          <a:solidFill>
-                            <a:schemeClr val="tx1"/>
-                          </a:solidFill>
-                          <a:effectLst/>
-                        </a:rPr>
-                        <a:t>0.215</a:t>
-                      </a:r>
-                      <a:endParaRPr lang="en-US" sz="1100">
-                        <a:solidFill>
-                          <a:schemeClr val="tx1"/>
-                        </a:solidFill>
-                        <a:effectLst/>
-                        <a:latin typeface="Calibri" panose="020F0502020204030204" pitchFamily="34" charset="0"/>
-                        <a:ea typeface="Calibri" panose="020F0502020204030204" pitchFamily="34" charset="0"/>
-                        <a:cs typeface="Times New Roman" panose="02020603050405020304" pitchFamily="18" charset="0"/>
-                      </a:endParaRPr>
-                    </a:p>
-                  </a:txBody>
-                  <a:tcPr marL="68580" marR="68580" marT="0" marB="0" anchor="ctr">
-                    <a:lnL w="12700" cap="flat" cmpd="sng" algn="ctr">
-                      <a:solidFill>
-                        <a:schemeClr val="tx1"/>
-                      </a:solidFill>
-                      <a:prstDash val="solid"/>
-                      <a:round/>
-                      <a:headEnd type="none" w="med" len="med"/>
-                      <a:tailEnd type="none" w="med" len="med"/>
-                    </a:lnL>
-                    <a:lnR w="12700" cap="flat" cmpd="sng" algn="ctr">
-                      <a:solidFill>
-                        <a:schemeClr val="tx1"/>
-                      </a:solidFill>
-                      <a:prstDash val="solid"/>
-                      <a:round/>
-                      <a:headEnd type="none" w="med" len="med"/>
-                      <a:tailEnd type="none" w="med" len="med"/>
-                    </a:lnR>
-                    <a:lnT w="12700" cap="flat" cmpd="sng" algn="ctr">
-                      <a:solidFill>
-                        <a:schemeClr val="tx1"/>
-                      </a:solidFill>
-                      <a:prstDash val="solid"/>
-                      <a:round/>
-                      <a:headEnd type="none" w="med" len="med"/>
-                      <a:tailEnd type="none" w="med" len="med"/>
-                    </a:lnT>
-                    <a:lnB w="12700" cap="flat" cmpd="sng" algn="ctr">
-                      <a:solidFill>
-                        <a:schemeClr val="tx1"/>
-                      </a:solidFill>
-                      <a:prstDash val="sysDot"/>
-                      <a:round/>
-                      <a:headEnd type="none" w="med" len="med"/>
-                      <a:tailEnd type="none" w="med" len="med"/>
-                    </a:lnB>
-                    <a:lnTlToBr w="12700" cmpd="sng">
-                      <a:noFill/>
-                      <a:prstDash val="solid"/>
-                    </a:lnTlToBr>
-                    <a:lnBlToTr w="12700" cmpd="sng">
-                      <a:noFill/>
-                      <a:prstDash val="solid"/>
-                    </a:lnBlToTr>
-                    <a:noFill/>
-                  </a:tcPr>
-                </a:tc>
-                <a:extLst>
-                  <a:ext uri="{0D108BD9-81ED-4DB2-BD59-A6C34878D82A}">
-                    <a16:rowId xmlns:a16="http://schemas.microsoft.com/office/drawing/2014/main" val="3692465145"/>
-                  </a:ext>
-                </a:extLst>
-              </a:tr>
-              <a:tr h="203200">
-                <a:tc>
-                  <a:txBody>
-                    <a:bodyPr/>
-                    <a:lstStyle/>
-                    <a:p>
-                      <a:pPr marL="0" marR="0">
-                        <a:lnSpc>
-                          <a:spcPct val="107000"/>
-                        </a:lnSpc>
-                        <a:spcBef>
-                          <a:spcPts val="0"/>
-                        </a:spcBef>
-                        <a:spcAft>
-                          <a:spcPts val="0"/>
-                        </a:spcAft>
-                      </a:pPr>
-                      <a:r>
-                        <a:rPr lang="en-US" sz="1100" dirty="0" err="1">
-                          <a:solidFill>
-                            <a:schemeClr val="tx1"/>
-                          </a:solidFill>
-                          <a:effectLst/>
-                        </a:rPr>
-                        <a:t>taxable_income_amt</a:t>
-                      </a:r>
-                      <a:endParaRPr lang="en-US" sz="1100" dirty="0">
-                        <a:solidFill>
-                          <a:schemeClr val="tx1"/>
-                        </a:solidFill>
-                        <a:effectLst/>
-                        <a:latin typeface="Calibri" panose="020F0502020204030204" pitchFamily="34" charset="0"/>
-                        <a:ea typeface="Calibri" panose="020F0502020204030204" pitchFamily="34" charset="0"/>
-                        <a:cs typeface="Times New Roman" panose="02020603050405020304" pitchFamily="18" charset="0"/>
-                      </a:endParaRPr>
-                    </a:p>
-                  </a:txBody>
-                  <a:tcPr marL="68580" marR="68580" marT="0" marB="0" anchor="ctr">
-                    <a:lnL w="12700" cap="flat" cmpd="sng" algn="ctr">
-                      <a:solidFill>
-                        <a:schemeClr val="tx1"/>
-                      </a:solidFill>
-                      <a:prstDash val="solid"/>
-                      <a:round/>
-                      <a:headEnd type="none" w="med" len="med"/>
-                      <a:tailEnd type="none" w="med" len="med"/>
-                    </a:lnL>
-                    <a:lnR w="12700" cap="flat" cmpd="sng" algn="ctr">
-                      <a:solidFill>
-                        <a:schemeClr val="tx1"/>
-                      </a:solidFill>
-                      <a:prstDash val="solid"/>
-                      <a:round/>
-                      <a:headEnd type="none" w="med" len="med"/>
-                      <a:tailEnd type="none" w="med" len="med"/>
-                    </a:lnR>
-                    <a:lnT w="12700" cap="flat" cmpd="sng" algn="ctr">
-                      <a:solidFill>
-                        <a:schemeClr val="tx1"/>
-                      </a:solidFill>
-                      <a:prstDash val="sysDot"/>
-                      <a:round/>
-                      <a:headEnd type="none" w="med" len="med"/>
-                      <a:tailEnd type="none" w="med" len="med"/>
-                    </a:lnT>
-                    <a:lnB w="12700" cap="flat" cmpd="sng" algn="ctr">
-                      <a:solidFill>
-                        <a:schemeClr val="tx1"/>
-                      </a:solidFill>
-                      <a:prstDash val="sysDot"/>
-                      <a:round/>
-                      <a:headEnd type="none" w="med" len="med"/>
-                      <a:tailEnd type="none" w="med" len="med"/>
-                    </a:lnB>
-                    <a:lnTlToBr w="12700" cmpd="sng">
-                      <a:noFill/>
-                      <a:prstDash val="solid"/>
-                    </a:lnTlToBr>
-                    <a:lnBlToTr w="12700" cmpd="sng">
-                      <a:noFill/>
-                      <a:prstDash val="solid"/>
-                    </a:lnBlToTr>
-                    <a:noFill/>
-                  </a:tcPr>
-                </a:tc>
-                <a:tc>
-                  <a:txBody>
-                    <a:bodyPr/>
-                    <a:lstStyle/>
-                    <a:p>
-                      <a:pPr marL="0" marR="0">
-                        <a:lnSpc>
-                          <a:spcPct val="107000"/>
-                        </a:lnSpc>
-                        <a:spcBef>
-                          <a:spcPts val="0"/>
-                        </a:spcBef>
-                        <a:spcAft>
-                          <a:spcPts val="0"/>
-                        </a:spcAft>
-                      </a:pPr>
-                      <a:r>
-                        <a:rPr lang="en-US" sz="1100" dirty="0">
-                          <a:solidFill>
-                            <a:schemeClr val="tx1"/>
-                          </a:solidFill>
-                          <a:effectLst/>
-                        </a:rPr>
-                        <a:t>0.292</a:t>
-                      </a:r>
-                      <a:endParaRPr lang="en-US" sz="1100" dirty="0">
-                        <a:solidFill>
-                          <a:schemeClr val="tx1"/>
-                        </a:solidFill>
-                        <a:effectLst/>
-                        <a:latin typeface="Calibri" panose="020F0502020204030204" pitchFamily="34" charset="0"/>
-                        <a:ea typeface="Calibri" panose="020F0502020204030204" pitchFamily="34" charset="0"/>
-                        <a:cs typeface="Times New Roman" panose="02020603050405020304" pitchFamily="18" charset="0"/>
-                      </a:endParaRPr>
-                    </a:p>
-                  </a:txBody>
-                  <a:tcPr marL="68580" marR="68580" marT="0" marB="0" anchor="ctr">
-                    <a:lnL w="12700" cap="flat" cmpd="sng" algn="ctr">
-                      <a:solidFill>
-                        <a:schemeClr val="tx1"/>
-                      </a:solidFill>
-                      <a:prstDash val="solid"/>
-                      <a:round/>
-                      <a:headEnd type="none" w="med" len="med"/>
-                      <a:tailEnd type="none" w="med" len="med"/>
-                    </a:lnL>
-                    <a:lnR w="12700" cap="flat" cmpd="sng" algn="ctr">
-                      <a:solidFill>
-                        <a:schemeClr val="tx1"/>
-                      </a:solidFill>
-                      <a:prstDash val="solid"/>
-                      <a:round/>
-                      <a:headEnd type="none" w="med" len="med"/>
-                      <a:tailEnd type="none" w="med" len="med"/>
-                    </a:lnR>
-                    <a:lnT w="12700" cap="flat" cmpd="sng" algn="ctr">
-                      <a:solidFill>
-                        <a:schemeClr val="tx1"/>
-                      </a:solidFill>
-                      <a:prstDash val="sysDot"/>
-                      <a:round/>
-                      <a:headEnd type="none" w="med" len="med"/>
-                      <a:tailEnd type="none" w="med" len="med"/>
-                    </a:lnT>
-                    <a:lnB w="12700" cap="flat" cmpd="sng" algn="ctr">
-                      <a:solidFill>
-                        <a:schemeClr val="tx1"/>
-                      </a:solidFill>
-                      <a:prstDash val="sysDot"/>
-                      <a:round/>
-                      <a:headEnd type="none" w="med" len="med"/>
-                      <a:tailEnd type="none" w="med" len="med"/>
-                    </a:lnB>
-                    <a:lnTlToBr w="12700" cmpd="sng">
-                      <a:noFill/>
-                      <a:prstDash val="solid"/>
-                    </a:lnTlToBr>
-                    <a:lnBlToTr w="12700" cmpd="sng">
-                      <a:noFill/>
-                      <a:prstDash val="solid"/>
-                    </a:lnBlToTr>
-                    <a:noFill/>
-                  </a:tcPr>
-                </a:tc>
-                <a:extLst>
-                  <a:ext uri="{0D108BD9-81ED-4DB2-BD59-A6C34878D82A}">
-                    <a16:rowId xmlns:a16="http://schemas.microsoft.com/office/drawing/2014/main" val="350760248"/>
-                  </a:ext>
-                </a:extLst>
-              </a:tr>
-              <a:tr h="203200">
-                <a:tc>
-                  <a:txBody>
-                    <a:bodyPr/>
-                    <a:lstStyle/>
-                    <a:p>
-                      <a:pPr marL="0" marR="0">
-                        <a:lnSpc>
-                          <a:spcPct val="107000"/>
-                        </a:lnSpc>
-                        <a:spcBef>
-                          <a:spcPts val="0"/>
-                        </a:spcBef>
-                        <a:spcAft>
-                          <a:spcPts val="0"/>
-                        </a:spcAft>
-                      </a:pPr>
-                      <a:r>
-                        <a:rPr lang="en-US" sz="1100" dirty="0" err="1">
-                          <a:solidFill>
-                            <a:schemeClr val="tx1"/>
-                          </a:solidFill>
-                          <a:effectLst/>
-                        </a:rPr>
-                        <a:t>mortgageint_amt</a:t>
-                      </a:r>
-                      <a:endParaRPr lang="en-US" sz="1100" dirty="0">
-                        <a:solidFill>
-                          <a:schemeClr val="tx1"/>
-                        </a:solidFill>
-                        <a:effectLst/>
-                        <a:latin typeface="Calibri" panose="020F0502020204030204" pitchFamily="34" charset="0"/>
-                        <a:ea typeface="Calibri" panose="020F0502020204030204" pitchFamily="34" charset="0"/>
-                        <a:cs typeface="Times New Roman" panose="02020603050405020304" pitchFamily="18" charset="0"/>
-                      </a:endParaRPr>
-                    </a:p>
-                  </a:txBody>
-                  <a:tcPr marL="68580" marR="68580" marT="0" marB="0" anchor="ctr">
-                    <a:lnL w="12700" cap="flat" cmpd="sng" algn="ctr">
-                      <a:solidFill>
-                        <a:schemeClr val="tx1"/>
-                      </a:solidFill>
-                      <a:prstDash val="solid"/>
-                      <a:round/>
-                      <a:headEnd type="none" w="med" len="med"/>
-                      <a:tailEnd type="none" w="med" len="med"/>
-                    </a:lnL>
-                    <a:lnR w="12700" cap="flat" cmpd="sng" algn="ctr">
-                      <a:solidFill>
-                        <a:schemeClr val="tx1"/>
-                      </a:solidFill>
-                      <a:prstDash val="solid"/>
-                      <a:round/>
-                      <a:headEnd type="none" w="med" len="med"/>
-                      <a:tailEnd type="none" w="med" len="med"/>
-                    </a:lnR>
-                    <a:lnT w="12700" cap="flat" cmpd="sng" algn="ctr">
-                      <a:solidFill>
-                        <a:schemeClr val="tx1"/>
-                      </a:solidFill>
-                      <a:prstDash val="sysDot"/>
-                      <a:round/>
-                      <a:headEnd type="none" w="med" len="med"/>
-                      <a:tailEnd type="none" w="med" len="med"/>
-                    </a:lnT>
-                    <a:lnB w="12700" cap="flat" cmpd="sng" algn="ctr">
-                      <a:solidFill>
-                        <a:schemeClr val="tx1"/>
-                      </a:solidFill>
-                      <a:prstDash val="sysDot"/>
-                      <a:round/>
-                      <a:headEnd type="none" w="med" len="med"/>
-                      <a:tailEnd type="none" w="med" len="med"/>
-                    </a:lnB>
-                    <a:lnTlToBr w="12700" cmpd="sng">
-                      <a:noFill/>
-                      <a:prstDash val="solid"/>
-                    </a:lnTlToBr>
-                    <a:lnBlToTr w="12700" cmpd="sng">
-                      <a:noFill/>
-                      <a:prstDash val="solid"/>
-                    </a:lnBlToTr>
-                    <a:noFill/>
-                  </a:tcPr>
-                </a:tc>
-                <a:tc>
-                  <a:txBody>
-                    <a:bodyPr/>
-                    <a:lstStyle/>
-                    <a:p>
-                      <a:pPr marL="0" marR="0">
-                        <a:lnSpc>
-                          <a:spcPct val="107000"/>
-                        </a:lnSpc>
-                        <a:spcBef>
-                          <a:spcPts val="0"/>
-                        </a:spcBef>
-                        <a:spcAft>
-                          <a:spcPts val="0"/>
-                        </a:spcAft>
-                      </a:pPr>
-                      <a:r>
-                        <a:rPr lang="en-US" sz="1100" dirty="0">
-                          <a:solidFill>
-                            <a:schemeClr val="tx1"/>
-                          </a:solidFill>
-                          <a:effectLst/>
-                        </a:rPr>
-                        <a:t>0.174</a:t>
-                      </a:r>
-                      <a:endParaRPr lang="en-US" sz="1100" dirty="0">
-                        <a:solidFill>
-                          <a:schemeClr val="tx1"/>
-                        </a:solidFill>
-                        <a:effectLst/>
-                        <a:latin typeface="Calibri" panose="020F0502020204030204" pitchFamily="34" charset="0"/>
-                        <a:ea typeface="Calibri" panose="020F0502020204030204" pitchFamily="34" charset="0"/>
-                        <a:cs typeface="Times New Roman" panose="02020603050405020304" pitchFamily="18" charset="0"/>
-                      </a:endParaRPr>
-                    </a:p>
-                  </a:txBody>
-                  <a:tcPr marL="68580" marR="68580" marT="0" marB="0" anchor="ctr">
-                    <a:lnL w="12700" cap="flat" cmpd="sng" algn="ctr">
-                      <a:solidFill>
-                        <a:schemeClr val="tx1"/>
-                      </a:solidFill>
-                      <a:prstDash val="solid"/>
-                      <a:round/>
-                      <a:headEnd type="none" w="med" len="med"/>
-                      <a:tailEnd type="none" w="med" len="med"/>
-                    </a:lnL>
-                    <a:lnR w="12700" cap="flat" cmpd="sng" algn="ctr">
-                      <a:solidFill>
-                        <a:schemeClr val="tx1"/>
-                      </a:solidFill>
-                      <a:prstDash val="solid"/>
-                      <a:round/>
-                      <a:headEnd type="none" w="med" len="med"/>
-                      <a:tailEnd type="none" w="med" len="med"/>
-                    </a:lnR>
-                    <a:lnT w="12700" cap="flat" cmpd="sng" algn="ctr">
-                      <a:solidFill>
-                        <a:schemeClr val="tx1"/>
-                      </a:solidFill>
-                      <a:prstDash val="sysDot"/>
-                      <a:round/>
-                      <a:headEnd type="none" w="med" len="med"/>
-                      <a:tailEnd type="none" w="med" len="med"/>
-                    </a:lnT>
-                    <a:lnB w="12700" cap="flat" cmpd="sng" algn="ctr">
-                      <a:solidFill>
-                        <a:schemeClr val="tx1"/>
-                      </a:solidFill>
-                      <a:prstDash val="sysDot"/>
-                      <a:round/>
-                      <a:headEnd type="none" w="med" len="med"/>
-                      <a:tailEnd type="none" w="med" len="med"/>
-                    </a:lnB>
-                    <a:lnTlToBr w="12700" cmpd="sng">
-                      <a:noFill/>
-                      <a:prstDash val="solid"/>
-                    </a:lnTlToBr>
-                    <a:lnBlToTr w="12700" cmpd="sng">
-                      <a:noFill/>
-                      <a:prstDash val="solid"/>
-                    </a:lnBlToTr>
-                    <a:noFill/>
-                  </a:tcPr>
-                </a:tc>
-                <a:extLst>
-                  <a:ext uri="{0D108BD9-81ED-4DB2-BD59-A6C34878D82A}">
-                    <a16:rowId xmlns:a16="http://schemas.microsoft.com/office/drawing/2014/main" val="3866763595"/>
-                  </a:ext>
-                </a:extLst>
-              </a:tr>
-              <a:tr h="203200">
-                <a:tc>
-                  <a:txBody>
-                    <a:bodyPr/>
-                    <a:lstStyle/>
-                    <a:p>
-                      <a:pPr marL="0" marR="0">
-                        <a:lnSpc>
-                          <a:spcPct val="107000"/>
-                        </a:lnSpc>
-                        <a:spcBef>
-                          <a:spcPts val="0"/>
-                        </a:spcBef>
-                        <a:spcAft>
-                          <a:spcPts val="0"/>
-                        </a:spcAft>
-                      </a:pPr>
-                      <a:r>
-                        <a:rPr lang="en-US" sz="1100">
-                          <a:solidFill>
-                            <a:schemeClr val="tx1"/>
-                          </a:solidFill>
-                          <a:effectLst/>
-                        </a:rPr>
-                        <a:t>p_mortgageint_nr</a:t>
-                      </a:r>
-                      <a:endParaRPr lang="en-US" sz="1100">
-                        <a:solidFill>
-                          <a:schemeClr val="tx1"/>
-                        </a:solidFill>
-                        <a:effectLst/>
-                        <a:latin typeface="Calibri" panose="020F0502020204030204" pitchFamily="34" charset="0"/>
-                        <a:ea typeface="Calibri" panose="020F0502020204030204" pitchFamily="34" charset="0"/>
-                        <a:cs typeface="Times New Roman" panose="02020603050405020304" pitchFamily="18" charset="0"/>
-                      </a:endParaRPr>
-                    </a:p>
-                  </a:txBody>
-                  <a:tcPr marL="68580" marR="68580" marT="0" marB="0" anchor="ctr">
-                    <a:lnL w="12700" cap="flat" cmpd="sng" algn="ctr">
-                      <a:solidFill>
-                        <a:schemeClr val="tx1"/>
-                      </a:solidFill>
-                      <a:prstDash val="solid"/>
-                      <a:round/>
-                      <a:headEnd type="none" w="med" len="med"/>
-                      <a:tailEnd type="none" w="med" len="med"/>
-                    </a:lnL>
-                    <a:lnR w="12700" cap="flat" cmpd="sng" algn="ctr">
-                      <a:solidFill>
-                        <a:schemeClr val="tx1"/>
-                      </a:solidFill>
-                      <a:prstDash val="solid"/>
-                      <a:round/>
-                      <a:headEnd type="none" w="med" len="med"/>
-                      <a:tailEnd type="none" w="med" len="med"/>
-                    </a:lnR>
-                    <a:lnT w="12700" cap="flat" cmpd="sng" algn="ctr">
-                      <a:solidFill>
-                        <a:schemeClr val="tx1"/>
-                      </a:solidFill>
-                      <a:prstDash val="sysDot"/>
-                      <a:round/>
-                      <a:headEnd type="none" w="med" len="med"/>
-                      <a:tailEnd type="none" w="med" len="med"/>
-                    </a:lnT>
-                    <a:lnB w="12700" cap="flat" cmpd="sng" algn="ctr">
-                      <a:solidFill>
-                        <a:schemeClr val="tx1"/>
-                      </a:solidFill>
-                      <a:prstDash val="sysDot"/>
-                      <a:round/>
-                      <a:headEnd type="none" w="med" len="med"/>
-                      <a:tailEnd type="none" w="med" len="med"/>
-                    </a:lnB>
-                    <a:lnTlToBr w="12700" cmpd="sng">
-                      <a:noFill/>
-                      <a:prstDash val="solid"/>
-                    </a:lnTlToBr>
-                    <a:lnBlToTr w="12700" cmpd="sng">
-                      <a:noFill/>
-                      <a:prstDash val="solid"/>
-                    </a:lnBlToTr>
-                    <a:noFill/>
-                  </a:tcPr>
-                </a:tc>
-                <a:tc>
-                  <a:txBody>
-                    <a:bodyPr/>
-                    <a:lstStyle/>
-                    <a:p>
-                      <a:pPr marL="0" marR="0">
-                        <a:lnSpc>
-                          <a:spcPct val="107000"/>
-                        </a:lnSpc>
-                        <a:spcBef>
-                          <a:spcPts val="0"/>
-                        </a:spcBef>
-                        <a:spcAft>
-                          <a:spcPts val="0"/>
-                        </a:spcAft>
-                      </a:pPr>
-                      <a:r>
-                        <a:rPr lang="en-US" sz="1100">
-                          <a:solidFill>
-                            <a:schemeClr val="tx1"/>
-                          </a:solidFill>
-                          <a:effectLst/>
-                        </a:rPr>
-                        <a:t>0.020</a:t>
-                      </a:r>
-                      <a:endParaRPr lang="en-US" sz="1100">
-                        <a:solidFill>
-                          <a:schemeClr val="tx1"/>
-                        </a:solidFill>
-                        <a:effectLst/>
-                        <a:latin typeface="Calibri" panose="020F0502020204030204" pitchFamily="34" charset="0"/>
-                        <a:ea typeface="Calibri" panose="020F0502020204030204" pitchFamily="34" charset="0"/>
-                        <a:cs typeface="Times New Roman" panose="02020603050405020304" pitchFamily="18" charset="0"/>
-                      </a:endParaRPr>
-                    </a:p>
-                  </a:txBody>
-                  <a:tcPr marL="68580" marR="68580" marT="0" marB="0" anchor="ctr">
-                    <a:lnL w="12700" cap="flat" cmpd="sng" algn="ctr">
-                      <a:solidFill>
-                        <a:schemeClr val="tx1"/>
-                      </a:solidFill>
-                      <a:prstDash val="solid"/>
-                      <a:round/>
-                      <a:headEnd type="none" w="med" len="med"/>
-                      <a:tailEnd type="none" w="med" len="med"/>
-                    </a:lnL>
-                    <a:lnR w="12700" cap="flat" cmpd="sng" algn="ctr">
-                      <a:solidFill>
-                        <a:schemeClr val="tx1"/>
-                      </a:solidFill>
-                      <a:prstDash val="solid"/>
-                      <a:round/>
-                      <a:headEnd type="none" w="med" len="med"/>
-                      <a:tailEnd type="none" w="med" len="med"/>
-                    </a:lnR>
-                    <a:lnT w="12700" cap="flat" cmpd="sng" algn="ctr">
-                      <a:solidFill>
-                        <a:schemeClr val="tx1"/>
-                      </a:solidFill>
-                      <a:prstDash val="sysDot"/>
-                      <a:round/>
-                      <a:headEnd type="none" w="med" len="med"/>
-                      <a:tailEnd type="none" w="med" len="med"/>
-                    </a:lnT>
-                    <a:lnB w="12700" cap="flat" cmpd="sng" algn="ctr">
-                      <a:solidFill>
-                        <a:schemeClr val="tx1"/>
-                      </a:solidFill>
-                      <a:prstDash val="sysDot"/>
-                      <a:round/>
-                      <a:headEnd type="none" w="med" len="med"/>
-                      <a:tailEnd type="none" w="med" len="med"/>
-                    </a:lnB>
-                    <a:lnTlToBr w="12700" cmpd="sng">
-                      <a:noFill/>
-                      <a:prstDash val="solid"/>
-                    </a:lnTlToBr>
-                    <a:lnBlToTr w="12700" cmpd="sng">
-                      <a:noFill/>
-                      <a:prstDash val="solid"/>
-                    </a:lnBlToTr>
-                    <a:noFill/>
-                  </a:tcPr>
-                </a:tc>
-                <a:extLst>
-                  <a:ext uri="{0D108BD9-81ED-4DB2-BD59-A6C34878D82A}">
-                    <a16:rowId xmlns:a16="http://schemas.microsoft.com/office/drawing/2014/main" val="3620648936"/>
-                  </a:ext>
-                </a:extLst>
-              </a:tr>
-              <a:tr h="203200">
-                <a:tc>
-                  <a:txBody>
-                    <a:bodyPr/>
-                    <a:lstStyle/>
-                    <a:p>
-                      <a:pPr marL="0" marR="0">
-                        <a:lnSpc>
-                          <a:spcPct val="107000"/>
-                        </a:lnSpc>
-                        <a:spcBef>
-                          <a:spcPts val="0"/>
-                        </a:spcBef>
-                        <a:spcAft>
-                          <a:spcPts val="0"/>
-                        </a:spcAft>
-                      </a:pPr>
-                      <a:r>
-                        <a:rPr lang="en-US" sz="1100">
-                          <a:solidFill>
-                            <a:schemeClr val="tx1"/>
-                          </a:solidFill>
-                          <a:effectLst/>
-                        </a:rPr>
-                        <a:t>inctax_amt</a:t>
-                      </a:r>
-                      <a:endParaRPr lang="en-US" sz="1100">
-                        <a:solidFill>
-                          <a:schemeClr val="tx1"/>
-                        </a:solidFill>
-                        <a:effectLst/>
-                        <a:latin typeface="Calibri" panose="020F0502020204030204" pitchFamily="34" charset="0"/>
-                        <a:ea typeface="Calibri" panose="020F0502020204030204" pitchFamily="34" charset="0"/>
-                        <a:cs typeface="Times New Roman" panose="02020603050405020304" pitchFamily="18" charset="0"/>
-                      </a:endParaRPr>
-                    </a:p>
-                  </a:txBody>
-                  <a:tcPr marL="68580" marR="68580" marT="0" marB="0" anchor="ctr">
-                    <a:lnL w="12700" cap="flat" cmpd="sng" algn="ctr">
-                      <a:solidFill>
-                        <a:schemeClr val="tx1"/>
-                      </a:solidFill>
-                      <a:prstDash val="solid"/>
-                      <a:round/>
-                      <a:headEnd type="none" w="med" len="med"/>
-                      <a:tailEnd type="none" w="med" len="med"/>
-                    </a:lnL>
-                    <a:lnR w="12700" cap="flat" cmpd="sng" algn="ctr">
-                      <a:solidFill>
-                        <a:schemeClr val="tx1"/>
-                      </a:solidFill>
-                      <a:prstDash val="solid"/>
-                      <a:round/>
-                      <a:headEnd type="none" w="med" len="med"/>
-                      <a:tailEnd type="none" w="med" len="med"/>
-                    </a:lnR>
-                    <a:lnT w="12700" cap="flat" cmpd="sng" algn="ctr">
-                      <a:solidFill>
-                        <a:schemeClr val="tx1"/>
-                      </a:solidFill>
-                      <a:prstDash val="sysDot"/>
-                      <a:round/>
-                      <a:headEnd type="none" w="med" len="med"/>
-                      <a:tailEnd type="none" w="med" len="med"/>
-                    </a:lnT>
-                    <a:lnB w="12700" cap="flat" cmpd="sng" algn="ctr">
-                      <a:solidFill>
-                        <a:schemeClr val="tx1"/>
-                      </a:solidFill>
-                      <a:prstDash val="sysDot"/>
-                      <a:round/>
-                      <a:headEnd type="none" w="med" len="med"/>
-                      <a:tailEnd type="none" w="med" len="med"/>
-                    </a:lnB>
-                    <a:lnTlToBr w="12700" cmpd="sng">
-                      <a:noFill/>
-                      <a:prstDash val="solid"/>
-                    </a:lnTlToBr>
-                    <a:lnBlToTr w="12700" cmpd="sng">
-                      <a:noFill/>
-                      <a:prstDash val="solid"/>
-                    </a:lnBlToTr>
-                    <a:noFill/>
-                  </a:tcPr>
-                </a:tc>
-                <a:tc>
-                  <a:txBody>
-                    <a:bodyPr/>
-                    <a:lstStyle/>
-                    <a:p>
-                      <a:pPr marL="0" marR="0">
-                        <a:lnSpc>
-                          <a:spcPct val="107000"/>
-                        </a:lnSpc>
-                        <a:spcBef>
-                          <a:spcPts val="0"/>
-                        </a:spcBef>
-                        <a:spcAft>
-                          <a:spcPts val="0"/>
-                        </a:spcAft>
-                      </a:pPr>
-                      <a:r>
-                        <a:rPr lang="en-US" sz="1100" dirty="0">
-                          <a:solidFill>
-                            <a:schemeClr val="tx1"/>
-                          </a:solidFill>
-                          <a:effectLst/>
-                        </a:rPr>
-                        <a:t>0.292</a:t>
-                      </a:r>
-                      <a:endParaRPr lang="en-US" sz="1100" dirty="0">
-                        <a:solidFill>
-                          <a:schemeClr val="tx1"/>
-                        </a:solidFill>
-                        <a:effectLst/>
-                        <a:latin typeface="Calibri" panose="020F0502020204030204" pitchFamily="34" charset="0"/>
-                        <a:ea typeface="Calibri" panose="020F0502020204030204" pitchFamily="34" charset="0"/>
-                        <a:cs typeface="Times New Roman" panose="02020603050405020304" pitchFamily="18" charset="0"/>
-                      </a:endParaRPr>
-                    </a:p>
-                  </a:txBody>
-                  <a:tcPr marL="68580" marR="68580" marT="0" marB="0" anchor="ctr">
-                    <a:lnL w="12700" cap="flat" cmpd="sng" algn="ctr">
-                      <a:solidFill>
-                        <a:schemeClr val="tx1"/>
-                      </a:solidFill>
-                      <a:prstDash val="solid"/>
-                      <a:round/>
-                      <a:headEnd type="none" w="med" len="med"/>
-                      <a:tailEnd type="none" w="med" len="med"/>
-                    </a:lnL>
-                    <a:lnR w="12700" cap="flat" cmpd="sng" algn="ctr">
-                      <a:solidFill>
-                        <a:schemeClr val="tx1"/>
-                      </a:solidFill>
-                      <a:prstDash val="solid"/>
-                      <a:round/>
-                      <a:headEnd type="none" w="med" len="med"/>
-                      <a:tailEnd type="none" w="med" len="med"/>
-                    </a:lnR>
-                    <a:lnT w="12700" cap="flat" cmpd="sng" algn="ctr">
-                      <a:solidFill>
-                        <a:schemeClr val="tx1"/>
-                      </a:solidFill>
-                      <a:prstDash val="sysDot"/>
-                      <a:round/>
-                      <a:headEnd type="none" w="med" len="med"/>
-                      <a:tailEnd type="none" w="med" len="med"/>
-                    </a:lnT>
-                    <a:lnB w="12700" cap="flat" cmpd="sng" algn="ctr">
-                      <a:solidFill>
-                        <a:schemeClr val="tx1"/>
-                      </a:solidFill>
-                      <a:prstDash val="sysDot"/>
-                      <a:round/>
-                      <a:headEnd type="none" w="med" len="med"/>
-                      <a:tailEnd type="none" w="med" len="med"/>
-                    </a:lnB>
-                    <a:lnTlToBr w="12700" cmpd="sng">
-                      <a:noFill/>
-                      <a:prstDash val="solid"/>
-                    </a:lnTlToBr>
-                    <a:lnBlToTr w="12700" cmpd="sng">
-                      <a:noFill/>
-                      <a:prstDash val="solid"/>
-                    </a:lnBlToTr>
-                    <a:noFill/>
-                  </a:tcPr>
-                </a:tc>
-                <a:extLst>
-                  <a:ext uri="{0D108BD9-81ED-4DB2-BD59-A6C34878D82A}">
-                    <a16:rowId xmlns:a16="http://schemas.microsoft.com/office/drawing/2014/main" val="2250153953"/>
-                  </a:ext>
-                </a:extLst>
-              </a:tr>
-              <a:tr h="203200">
-                <a:tc>
-                  <a:txBody>
-                    <a:bodyPr/>
-                    <a:lstStyle/>
-                    <a:p>
-                      <a:pPr marL="0" marR="0">
-                        <a:lnSpc>
-                          <a:spcPct val="107000"/>
-                        </a:lnSpc>
-                        <a:spcBef>
-                          <a:spcPts val="0"/>
-                        </a:spcBef>
-                        <a:spcAft>
-                          <a:spcPts val="0"/>
-                        </a:spcAft>
-                      </a:pPr>
-                      <a:r>
-                        <a:rPr lang="en-US" sz="1100">
-                          <a:solidFill>
-                            <a:schemeClr val="tx1"/>
-                          </a:solidFill>
-                          <a:effectLst/>
-                        </a:rPr>
-                        <a:t>p_unemploy_nr</a:t>
-                      </a:r>
-                      <a:endParaRPr lang="en-US" sz="1100">
-                        <a:solidFill>
-                          <a:schemeClr val="tx1"/>
-                        </a:solidFill>
-                        <a:effectLst/>
-                        <a:latin typeface="Calibri" panose="020F0502020204030204" pitchFamily="34" charset="0"/>
-                        <a:ea typeface="Calibri" panose="020F0502020204030204" pitchFamily="34" charset="0"/>
-                        <a:cs typeface="Times New Roman" panose="02020603050405020304" pitchFamily="18" charset="0"/>
-                      </a:endParaRPr>
-                    </a:p>
-                  </a:txBody>
-                  <a:tcPr marL="68580" marR="68580" marT="0" marB="0" anchor="ctr">
-                    <a:lnL w="12700" cap="flat" cmpd="sng" algn="ctr">
-                      <a:solidFill>
-                        <a:schemeClr val="tx1"/>
-                      </a:solidFill>
-                      <a:prstDash val="solid"/>
-                      <a:round/>
-                      <a:headEnd type="none" w="med" len="med"/>
-                      <a:tailEnd type="none" w="med" len="med"/>
-                    </a:lnL>
-                    <a:lnR w="12700" cap="flat" cmpd="sng" algn="ctr">
-                      <a:solidFill>
-                        <a:schemeClr val="tx1"/>
-                      </a:solidFill>
-                      <a:prstDash val="solid"/>
-                      <a:round/>
-                      <a:headEnd type="none" w="med" len="med"/>
-                      <a:tailEnd type="none" w="med" len="med"/>
-                    </a:lnR>
-                    <a:lnT w="12700" cap="flat" cmpd="sng" algn="ctr">
-                      <a:solidFill>
-                        <a:schemeClr val="tx1"/>
-                      </a:solidFill>
-                      <a:prstDash val="sysDot"/>
-                      <a:round/>
-                      <a:headEnd type="none" w="med" len="med"/>
-                      <a:tailEnd type="none" w="med" len="med"/>
-                    </a:lnT>
-                    <a:lnB w="12700" cap="flat" cmpd="sng" algn="ctr">
-                      <a:solidFill>
-                        <a:schemeClr val="tx1"/>
-                      </a:solidFill>
-                      <a:prstDash val="sysDot"/>
-                      <a:round/>
-                      <a:headEnd type="none" w="med" len="med"/>
-                      <a:tailEnd type="none" w="med" len="med"/>
-                    </a:lnB>
-                    <a:lnTlToBr w="12700" cmpd="sng">
-                      <a:noFill/>
-                      <a:prstDash val="solid"/>
-                    </a:lnTlToBr>
-                    <a:lnBlToTr w="12700" cmpd="sng">
-                      <a:noFill/>
-                      <a:prstDash val="solid"/>
-                    </a:lnBlToTr>
-                    <a:noFill/>
-                  </a:tcPr>
-                </a:tc>
-                <a:tc>
-                  <a:txBody>
-                    <a:bodyPr/>
-                    <a:lstStyle/>
-                    <a:p>
-                      <a:pPr marL="0" marR="0">
-                        <a:lnSpc>
-                          <a:spcPct val="107000"/>
-                        </a:lnSpc>
-                        <a:spcBef>
-                          <a:spcPts val="0"/>
-                        </a:spcBef>
-                        <a:spcAft>
-                          <a:spcPts val="0"/>
-                        </a:spcAft>
-                      </a:pPr>
-                      <a:r>
-                        <a:rPr lang="en-US" sz="1100" dirty="0">
-                          <a:solidFill>
-                            <a:schemeClr val="tx1"/>
-                          </a:solidFill>
-                          <a:effectLst/>
-                        </a:rPr>
-                        <a:t>-0.176</a:t>
-                      </a:r>
-                      <a:endParaRPr lang="en-US" sz="1100" dirty="0">
-                        <a:solidFill>
-                          <a:schemeClr val="tx1"/>
-                        </a:solidFill>
-                        <a:effectLst/>
-                        <a:latin typeface="Calibri" panose="020F0502020204030204" pitchFamily="34" charset="0"/>
-                        <a:ea typeface="Calibri" panose="020F0502020204030204" pitchFamily="34" charset="0"/>
-                        <a:cs typeface="Times New Roman" panose="02020603050405020304" pitchFamily="18" charset="0"/>
-                      </a:endParaRPr>
-                    </a:p>
-                  </a:txBody>
-                  <a:tcPr marL="68580" marR="68580" marT="0" marB="0" anchor="ctr">
-                    <a:lnL w="12700" cap="flat" cmpd="sng" algn="ctr">
-                      <a:solidFill>
-                        <a:schemeClr val="tx1"/>
-                      </a:solidFill>
-                      <a:prstDash val="solid"/>
-                      <a:round/>
-                      <a:headEnd type="none" w="med" len="med"/>
-                      <a:tailEnd type="none" w="med" len="med"/>
-                    </a:lnL>
-                    <a:lnR w="12700" cap="flat" cmpd="sng" algn="ctr">
-                      <a:solidFill>
-                        <a:schemeClr val="tx1"/>
-                      </a:solidFill>
-                      <a:prstDash val="solid"/>
-                      <a:round/>
-                      <a:headEnd type="none" w="med" len="med"/>
-                      <a:tailEnd type="none" w="med" len="med"/>
-                    </a:lnR>
-                    <a:lnT w="12700" cap="flat" cmpd="sng" algn="ctr">
-                      <a:solidFill>
-                        <a:schemeClr val="tx1"/>
-                      </a:solidFill>
-                      <a:prstDash val="sysDot"/>
-                      <a:round/>
-                      <a:headEnd type="none" w="med" len="med"/>
-                      <a:tailEnd type="none" w="med" len="med"/>
-                    </a:lnT>
-                    <a:lnB w="12700" cap="flat" cmpd="sng" algn="ctr">
-                      <a:solidFill>
-                        <a:schemeClr val="tx1"/>
-                      </a:solidFill>
-                      <a:prstDash val="sysDot"/>
-                      <a:round/>
-                      <a:headEnd type="none" w="med" len="med"/>
-                      <a:tailEnd type="none" w="med" len="med"/>
-                    </a:lnB>
-                    <a:lnTlToBr w="12700" cmpd="sng">
-                      <a:noFill/>
-                      <a:prstDash val="solid"/>
-                    </a:lnTlToBr>
-                    <a:lnBlToTr w="12700" cmpd="sng">
-                      <a:noFill/>
-                      <a:prstDash val="solid"/>
-                    </a:lnBlToTr>
-                    <a:noFill/>
-                  </a:tcPr>
-                </a:tc>
-                <a:extLst>
-                  <a:ext uri="{0D108BD9-81ED-4DB2-BD59-A6C34878D82A}">
-                    <a16:rowId xmlns:a16="http://schemas.microsoft.com/office/drawing/2014/main" val="2355892082"/>
-                  </a:ext>
-                </a:extLst>
-              </a:tr>
-              <a:tr h="203200">
-                <a:tc>
-                  <a:txBody>
-                    <a:bodyPr/>
-                    <a:lstStyle/>
-                    <a:p>
-                      <a:pPr marL="0" marR="0">
-                        <a:lnSpc>
-                          <a:spcPct val="107000"/>
-                        </a:lnSpc>
-                        <a:spcBef>
-                          <a:spcPts val="0"/>
-                        </a:spcBef>
-                        <a:spcAft>
-                          <a:spcPts val="0"/>
-                        </a:spcAft>
-                      </a:pPr>
-                      <a:r>
-                        <a:rPr lang="en-US" sz="1100">
-                          <a:solidFill>
-                            <a:schemeClr val="tx1"/>
-                          </a:solidFill>
-                          <a:effectLst/>
-                        </a:rPr>
-                        <a:t>agi_amt</a:t>
-                      </a:r>
-                      <a:endParaRPr lang="en-US" sz="1100">
-                        <a:solidFill>
-                          <a:schemeClr val="tx1"/>
-                        </a:solidFill>
-                        <a:effectLst/>
-                        <a:latin typeface="Calibri" panose="020F0502020204030204" pitchFamily="34" charset="0"/>
-                        <a:ea typeface="Calibri" panose="020F0502020204030204" pitchFamily="34" charset="0"/>
-                        <a:cs typeface="Times New Roman" panose="02020603050405020304" pitchFamily="18" charset="0"/>
-                      </a:endParaRPr>
-                    </a:p>
-                  </a:txBody>
-                  <a:tcPr marL="68580" marR="68580" marT="0" marB="0" anchor="ctr">
-                    <a:lnL w="12700" cap="flat" cmpd="sng" algn="ctr">
-                      <a:solidFill>
-                        <a:schemeClr val="tx1"/>
-                      </a:solidFill>
-                      <a:prstDash val="solid"/>
-                      <a:round/>
-                      <a:headEnd type="none" w="med" len="med"/>
-                      <a:tailEnd type="none" w="med" len="med"/>
-                    </a:lnL>
-                    <a:lnR w="12700" cap="flat" cmpd="sng" algn="ctr">
-                      <a:solidFill>
-                        <a:schemeClr val="tx1"/>
-                      </a:solidFill>
-                      <a:prstDash val="solid"/>
-                      <a:round/>
-                      <a:headEnd type="none" w="med" len="med"/>
-                      <a:tailEnd type="none" w="med" len="med"/>
-                    </a:lnR>
-                    <a:lnT w="12700" cap="flat" cmpd="sng" algn="ctr">
-                      <a:solidFill>
-                        <a:schemeClr val="tx1"/>
-                      </a:solidFill>
-                      <a:prstDash val="sysDot"/>
-                      <a:round/>
-                      <a:headEnd type="none" w="med" len="med"/>
-                      <a:tailEnd type="none" w="med" len="med"/>
-                    </a:lnT>
-                    <a:lnB w="12700" cap="flat" cmpd="sng" algn="ctr">
-                      <a:solidFill>
-                        <a:schemeClr val="tx1"/>
-                      </a:solidFill>
-                      <a:prstDash val="sysDot"/>
-                      <a:round/>
-                      <a:headEnd type="none" w="med" len="med"/>
-                      <a:tailEnd type="none" w="med" len="med"/>
-                    </a:lnB>
-                    <a:lnTlToBr w="12700" cmpd="sng">
-                      <a:noFill/>
-                      <a:prstDash val="solid"/>
-                    </a:lnTlToBr>
-                    <a:lnBlToTr w="12700" cmpd="sng">
-                      <a:noFill/>
-                      <a:prstDash val="solid"/>
-                    </a:lnBlToTr>
-                    <a:noFill/>
-                  </a:tcPr>
-                </a:tc>
-                <a:tc>
-                  <a:txBody>
-                    <a:bodyPr/>
-                    <a:lstStyle/>
-                    <a:p>
-                      <a:pPr marL="0" marR="0">
-                        <a:lnSpc>
-                          <a:spcPct val="107000"/>
-                        </a:lnSpc>
-                        <a:spcBef>
-                          <a:spcPts val="0"/>
-                        </a:spcBef>
-                        <a:spcAft>
-                          <a:spcPts val="0"/>
-                        </a:spcAft>
-                      </a:pPr>
-                      <a:r>
-                        <a:rPr lang="en-US" sz="1100" dirty="0">
-                          <a:solidFill>
-                            <a:schemeClr val="tx1"/>
-                          </a:solidFill>
-                          <a:effectLst/>
-                        </a:rPr>
-                        <a:t>0.288</a:t>
-                      </a:r>
-                      <a:endParaRPr lang="en-US" sz="1100" dirty="0">
-                        <a:solidFill>
-                          <a:schemeClr val="tx1"/>
-                        </a:solidFill>
-                        <a:effectLst/>
-                        <a:latin typeface="Calibri" panose="020F0502020204030204" pitchFamily="34" charset="0"/>
-                        <a:ea typeface="Calibri" panose="020F0502020204030204" pitchFamily="34" charset="0"/>
-                        <a:cs typeface="Times New Roman" panose="02020603050405020304" pitchFamily="18" charset="0"/>
-                      </a:endParaRPr>
-                    </a:p>
-                  </a:txBody>
-                  <a:tcPr marL="68580" marR="68580" marT="0" marB="0" anchor="ctr">
-                    <a:lnL w="12700" cap="flat" cmpd="sng" algn="ctr">
-                      <a:solidFill>
-                        <a:schemeClr val="tx1"/>
-                      </a:solidFill>
-                      <a:prstDash val="solid"/>
-                      <a:round/>
-                      <a:headEnd type="none" w="med" len="med"/>
-                      <a:tailEnd type="none" w="med" len="med"/>
-                    </a:lnL>
-                    <a:lnR w="12700" cap="flat" cmpd="sng" algn="ctr">
-                      <a:solidFill>
-                        <a:schemeClr val="tx1"/>
-                      </a:solidFill>
-                      <a:prstDash val="solid"/>
-                      <a:round/>
-                      <a:headEnd type="none" w="med" len="med"/>
-                      <a:tailEnd type="none" w="med" len="med"/>
-                    </a:lnR>
-                    <a:lnT w="12700" cap="flat" cmpd="sng" algn="ctr">
-                      <a:solidFill>
-                        <a:schemeClr val="tx1"/>
-                      </a:solidFill>
-                      <a:prstDash val="sysDot"/>
-                      <a:round/>
-                      <a:headEnd type="none" w="med" len="med"/>
-                      <a:tailEnd type="none" w="med" len="med"/>
-                    </a:lnT>
-                    <a:lnB w="12700" cap="flat" cmpd="sng" algn="ctr">
-                      <a:solidFill>
-                        <a:schemeClr val="tx1"/>
-                      </a:solidFill>
-                      <a:prstDash val="sysDot"/>
-                      <a:round/>
-                      <a:headEnd type="none" w="med" len="med"/>
-                      <a:tailEnd type="none" w="med" len="med"/>
-                    </a:lnB>
-                    <a:lnTlToBr w="12700" cmpd="sng">
-                      <a:noFill/>
-                      <a:prstDash val="solid"/>
-                    </a:lnTlToBr>
-                    <a:lnBlToTr w="12700" cmpd="sng">
-                      <a:noFill/>
-                      <a:prstDash val="solid"/>
-                    </a:lnBlToTr>
-                    <a:noFill/>
-                  </a:tcPr>
-                </a:tc>
-                <a:extLst>
-                  <a:ext uri="{0D108BD9-81ED-4DB2-BD59-A6C34878D82A}">
-                    <a16:rowId xmlns:a16="http://schemas.microsoft.com/office/drawing/2014/main" val="2563439791"/>
-                  </a:ext>
-                </a:extLst>
-              </a:tr>
-              <a:tr h="203200">
-                <a:tc>
-                  <a:txBody>
-                    <a:bodyPr/>
-                    <a:lstStyle/>
-                    <a:p>
-                      <a:pPr marL="0" marR="0">
-                        <a:lnSpc>
-                          <a:spcPct val="107000"/>
-                        </a:lnSpc>
-                        <a:spcBef>
-                          <a:spcPts val="0"/>
-                        </a:spcBef>
-                        <a:spcAft>
-                          <a:spcPts val="0"/>
-                        </a:spcAft>
-                      </a:pPr>
-                      <a:r>
-                        <a:rPr lang="en-US" sz="1100">
-                          <a:solidFill>
-                            <a:schemeClr val="tx1"/>
-                          </a:solidFill>
-                          <a:effectLst/>
-                        </a:rPr>
-                        <a:t>num_dependents</a:t>
-                      </a:r>
-                      <a:endParaRPr lang="en-US" sz="1100">
-                        <a:solidFill>
-                          <a:schemeClr val="tx1"/>
-                        </a:solidFill>
-                        <a:effectLst/>
-                        <a:latin typeface="Calibri" panose="020F0502020204030204" pitchFamily="34" charset="0"/>
-                        <a:ea typeface="Calibri" panose="020F0502020204030204" pitchFamily="34" charset="0"/>
-                        <a:cs typeface="Times New Roman" panose="02020603050405020304" pitchFamily="18" charset="0"/>
-                      </a:endParaRPr>
-                    </a:p>
-                  </a:txBody>
-                  <a:tcPr marL="68580" marR="68580" marT="0" marB="0" anchor="ctr">
-                    <a:lnL w="12700" cap="flat" cmpd="sng" algn="ctr">
-                      <a:solidFill>
-                        <a:schemeClr val="tx1"/>
-                      </a:solidFill>
-                      <a:prstDash val="solid"/>
-                      <a:round/>
-                      <a:headEnd type="none" w="med" len="med"/>
-                      <a:tailEnd type="none" w="med" len="med"/>
-                    </a:lnL>
-                    <a:lnR w="12700" cap="flat" cmpd="sng" algn="ctr">
-                      <a:solidFill>
-                        <a:schemeClr val="tx1"/>
-                      </a:solidFill>
-                      <a:prstDash val="solid"/>
-                      <a:round/>
-                      <a:headEnd type="none" w="med" len="med"/>
-                      <a:tailEnd type="none" w="med" len="med"/>
-                    </a:lnR>
-                    <a:lnT w="12700" cap="flat" cmpd="sng" algn="ctr">
-                      <a:solidFill>
-                        <a:schemeClr val="tx1"/>
-                      </a:solidFill>
-                      <a:prstDash val="sysDot"/>
-                      <a:round/>
-                      <a:headEnd type="none" w="med" len="med"/>
-                      <a:tailEnd type="none" w="med" len="med"/>
-                    </a:lnT>
-                    <a:lnB w="12700" cap="flat" cmpd="sng" algn="ctr">
-                      <a:solidFill>
-                        <a:schemeClr val="tx1"/>
-                      </a:solidFill>
-                      <a:prstDash val="sysDot"/>
-                      <a:round/>
-                      <a:headEnd type="none" w="med" len="med"/>
-                      <a:tailEnd type="none" w="med" len="med"/>
-                    </a:lnB>
-                    <a:lnTlToBr w="12700" cmpd="sng">
-                      <a:noFill/>
-                      <a:prstDash val="solid"/>
-                    </a:lnTlToBr>
-                    <a:lnBlToTr w="12700" cmpd="sng">
-                      <a:noFill/>
-                      <a:prstDash val="solid"/>
-                    </a:lnBlToTr>
-                    <a:noFill/>
-                  </a:tcPr>
-                </a:tc>
-                <a:tc>
-                  <a:txBody>
-                    <a:bodyPr/>
-                    <a:lstStyle/>
-                    <a:p>
-                      <a:pPr marL="0" marR="0">
-                        <a:lnSpc>
-                          <a:spcPct val="107000"/>
-                        </a:lnSpc>
-                        <a:spcBef>
-                          <a:spcPts val="0"/>
-                        </a:spcBef>
-                        <a:spcAft>
-                          <a:spcPts val="0"/>
-                        </a:spcAft>
-                      </a:pPr>
-                      <a:r>
-                        <a:rPr lang="en-US" sz="1100" dirty="0">
-                          <a:solidFill>
-                            <a:schemeClr val="tx1"/>
-                          </a:solidFill>
-                          <a:effectLst/>
-                        </a:rPr>
-                        <a:t>-0.144</a:t>
-                      </a:r>
-                      <a:endParaRPr lang="en-US" sz="1100" dirty="0">
-                        <a:solidFill>
-                          <a:schemeClr val="tx1"/>
-                        </a:solidFill>
-                        <a:effectLst/>
-                        <a:latin typeface="Calibri" panose="020F0502020204030204" pitchFamily="34" charset="0"/>
-                        <a:ea typeface="Calibri" panose="020F0502020204030204" pitchFamily="34" charset="0"/>
-                        <a:cs typeface="Times New Roman" panose="02020603050405020304" pitchFamily="18" charset="0"/>
-                      </a:endParaRPr>
-                    </a:p>
-                  </a:txBody>
-                  <a:tcPr marL="68580" marR="68580" marT="0" marB="0" anchor="ctr">
-                    <a:lnL w="12700" cap="flat" cmpd="sng" algn="ctr">
-                      <a:solidFill>
-                        <a:schemeClr val="tx1"/>
-                      </a:solidFill>
-                      <a:prstDash val="solid"/>
-                      <a:round/>
-                      <a:headEnd type="none" w="med" len="med"/>
-                      <a:tailEnd type="none" w="med" len="med"/>
-                    </a:lnL>
-                    <a:lnR w="12700" cap="flat" cmpd="sng" algn="ctr">
-                      <a:solidFill>
-                        <a:schemeClr val="tx1"/>
-                      </a:solidFill>
-                      <a:prstDash val="solid"/>
-                      <a:round/>
-                      <a:headEnd type="none" w="med" len="med"/>
-                      <a:tailEnd type="none" w="med" len="med"/>
-                    </a:lnR>
-                    <a:lnT w="12700" cap="flat" cmpd="sng" algn="ctr">
-                      <a:solidFill>
-                        <a:schemeClr val="tx1"/>
-                      </a:solidFill>
-                      <a:prstDash val="sysDot"/>
-                      <a:round/>
-                      <a:headEnd type="none" w="med" len="med"/>
-                      <a:tailEnd type="none" w="med" len="med"/>
-                    </a:lnT>
-                    <a:lnB w="12700" cap="flat" cmpd="sng" algn="ctr">
-                      <a:solidFill>
-                        <a:schemeClr val="tx1"/>
-                      </a:solidFill>
-                      <a:prstDash val="sysDot"/>
-                      <a:round/>
-                      <a:headEnd type="none" w="med" len="med"/>
-                      <a:tailEnd type="none" w="med" len="med"/>
-                    </a:lnB>
-                    <a:lnTlToBr w="12700" cmpd="sng">
-                      <a:noFill/>
-                      <a:prstDash val="solid"/>
-                    </a:lnTlToBr>
-                    <a:lnBlToTr w="12700" cmpd="sng">
-                      <a:noFill/>
-                      <a:prstDash val="solid"/>
-                    </a:lnBlToTr>
-                    <a:noFill/>
-                  </a:tcPr>
-                </a:tc>
-                <a:extLst>
-                  <a:ext uri="{0D108BD9-81ED-4DB2-BD59-A6C34878D82A}">
-                    <a16:rowId xmlns:a16="http://schemas.microsoft.com/office/drawing/2014/main" val="2581359321"/>
-                  </a:ext>
-                </a:extLst>
-              </a:tr>
-              <a:tr h="203200">
-                <a:tc>
-                  <a:txBody>
-                    <a:bodyPr/>
-                    <a:lstStyle/>
-                    <a:p>
-                      <a:pPr marL="0" marR="0">
-                        <a:lnSpc>
-                          <a:spcPct val="107000"/>
-                        </a:lnSpc>
-                        <a:spcBef>
-                          <a:spcPts val="0"/>
-                        </a:spcBef>
-                        <a:spcAft>
-                          <a:spcPts val="0"/>
-                        </a:spcAft>
-                      </a:pPr>
-                      <a:r>
-                        <a:rPr lang="en-US" sz="1100">
-                          <a:solidFill>
-                            <a:schemeClr val="tx1"/>
-                          </a:solidFill>
-                          <a:effectLst/>
-                        </a:rPr>
-                        <a:t>p_re_taxes_nr</a:t>
-                      </a:r>
-                      <a:endParaRPr lang="en-US" sz="1100">
-                        <a:solidFill>
-                          <a:schemeClr val="tx1"/>
-                        </a:solidFill>
-                        <a:effectLst/>
-                        <a:latin typeface="Calibri" panose="020F0502020204030204" pitchFamily="34" charset="0"/>
-                        <a:ea typeface="Calibri" panose="020F0502020204030204" pitchFamily="34" charset="0"/>
-                        <a:cs typeface="Times New Roman" panose="02020603050405020304" pitchFamily="18" charset="0"/>
-                      </a:endParaRPr>
-                    </a:p>
-                  </a:txBody>
-                  <a:tcPr marL="68580" marR="68580" marT="0" marB="0" anchor="ctr">
-                    <a:lnL w="12700" cap="flat" cmpd="sng" algn="ctr">
-                      <a:solidFill>
-                        <a:schemeClr val="tx1"/>
-                      </a:solidFill>
-                      <a:prstDash val="solid"/>
-                      <a:round/>
-                      <a:headEnd type="none" w="med" len="med"/>
-                      <a:tailEnd type="none" w="med" len="med"/>
-                    </a:lnL>
-                    <a:lnR w="12700" cap="flat" cmpd="sng" algn="ctr">
-                      <a:solidFill>
-                        <a:schemeClr val="tx1"/>
-                      </a:solidFill>
-                      <a:prstDash val="solid"/>
-                      <a:round/>
-                      <a:headEnd type="none" w="med" len="med"/>
-                      <a:tailEnd type="none" w="med" len="med"/>
-                    </a:lnR>
-                    <a:lnT w="12700" cap="flat" cmpd="sng" algn="ctr">
-                      <a:solidFill>
-                        <a:schemeClr val="tx1"/>
-                      </a:solidFill>
-                      <a:prstDash val="sysDot"/>
-                      <a:round/>
-                      <a:headEnd type="none" w="med" len="med"/>
-                      <a:tailEnd type="none" w="med" len="med"/>
-                    </a:lnT>
-                    <a:lnB w="12700" cap="flat" cmpd="sng" algn="ctr">
-                      <a:solidFill>
-                        <a:schemeClr val="tx1"/>
-                      </a:solidFill>
-                      <a:prstDash val="sysDot"/>
-                      <a:round/>
-                      <a:headEnd type="none" w="med" len="med"/>
-                      <a:tailEnd type="none" w="med" len="med"/>
-                    </a:lnB>
-                    <a:lnTlToBr w="12700" cmpd="sng">
-                      <a:noFill/>
-                      <a:prstDash val="solid"/>
-                    </a:lnTlToBr>
-                    <a:lnBlToTr w="12700" cmpd="sng">
-                      <a:noFill/>
-                      <a:prstDash val="solid"/>
-                    </a:lnBlToTr>
-                    <a:noFill/>
-                  </a:tcPr>
-                </a:tc>
-                <a:tc>
-                  <a:txBody>
-                    <a:bodyPr/>
-                    <a:lstStyle/>
-                    <a:p>
-                      <a:pPr marL="0" marR="0">
-                        <a:lnSpc>
-                          <a:spcPct val="107000"/>
-                        </a:lnSpc>
-                        <a:spcBef>
-                          <a:spcPts val="0"/>
-                        </a:spcBef>
-                        <a:spcAft>
-                          <a:spcPts val="0"/>
-                        </a:spcAft>
-                      </a:pPr>
-                      <a:r>
-                        <a:rPr lang="en-US" sz="1100" dirty="0">
-                          <a:solidFill>
-                            <a:schemeClr val="tx1"/>
-                          </a:solidFill>
-                          <a:effectLst/>
-                        </a:rPr>
-                        <a:t>0.032</a:t>
-                      </a:r>
-                      <a:endParaRPr lang="en-US" sz="1100" dirty="0">
-                        <a:solidFill>
-                          <a:schemeClr val="tx1"/>
-                        </a:solidFill>
-                        <a:effectLst/>
-                        <a:latin typeface="Calibri" panose="020F0502020204030204" pitchFamily="34" charset="0"/>
-                        <a:ea typeface="Calibri" panose="020F0502020204030204" pitchFamily="34" charset="0"/>
-                        <a:cs typeface="Times New Roman" panose="02020603050405020304" pitchFamily="18" charset="0"/>
-                      </a:endParaRPr>
-                    </a:p>
-                  </a:txBody>
-                  <a:tcPr marL="68580" marR="68580" marT="0" marB="0" anchor="ctr">
-                    <a:lnL w="12700" cap="flat" cmpd="sng" algn="ctr">
-                      <a:solidFill>
-                        <a:schemeClr val="tx1"/>
-                      </a:solidFill>
-                      <a:prstDash val="solid"/>
-                      <a:round/>
-                      <a:headEnd type="none" w="med" len="med"/>
-                      <a:tailEnd type="none" w="med" len="med"/>
-                    </a:lnL>
-                    <a:lnR w="12700" cap="flat" cmpd="sng" algn="ctr">
-                      <a:solidFill>
-                        <a:schemeClr val="tx1"/>
-                      </a:solidFill>
-                      <a:prstDash val="solid"/>
-                      <a:round/>
-                      <a:headEnd type="none" w="med" len="med"/>
-                      <a:tailEnd type="none" w="med" len="med"/>
-                    </a:lnR>
-                    <a:lnT w="12700" cap="flat" cmpd="sng" algn="ctr">
-                      <a:solidFill>
-                        <a:schemeClr val="tx1"/>
-                      </a:solidFill>
-                      <a:prstDash val="sysDot"/>
-                      <a:round/>
-                      <a:headEnd type="none" w="med" len="med"/>
-                      <a:tailEnd type="none" w="med" len="med"/>
-                    </a:lnT>
-                    <a:lnB w="12700" cap="flat" cmpd="sng" algn="ctr">
-                      <a:solidFill>
-                        <a:schemeClr val="tx1"/>
-                      </a:solidFill>
-                      <a:prstDash val="sysDot"/>
-                      <a:round/>
-                      <a:headEnd type="none" w="med" len="med"/>
-                      <a:tailEnd type="none" w="med" len="med"/>
-                    </a:lnB>
-                    <a:lnTlToBr w="12700" cmpd="sng">
-                      <a:noFill/>
-                      <a:prstDash val="solid"/>
-                    </a:lnTlToBr>
-                    <a:lnBlToTr w="12700" cmpd="sng">
-                      <a:noFill/>
-                      <a:prstDash val="solid"/>
-                    </a:lnBlToTr>
-                    <a:noFill/>
-                  </a:tcPr>
-                </a:tc>
-                <a:extLst>
-                  <a:ext uri="{0D108BD9-81ED-4DB2-BD59-A6C34878D82A}">
-                    <a16:rowId xmlns:a16="http://schemas.microsoft.com/office/drawing/2014/main" val="2880447647"/>
-                  </a:ext>
-                </a:extLst>
-              </a:tr>
-              <a:tr h="203200">
-                <a:tc>
-                  <a:txBody>
-                    <a:bodyPr/>
-                    <a:lstStyle/>
-                    <a:p>
-                      <a:pPr marL="0" marR="0">
-                        <a:lnSpc>
-                          <a:spcPct val="107000"/>
-                        </a:lnSpc>
-                        <a:spcBef>
-                          <a:spcPts val="0"/>
-                        </a:spcBef>
-                        <a:spcAft>
-                          <a:spcPts val="0"/>
-                        </a:spcAft>
-                      </a:pPr>
-                      <a:r>
-                        <a:rPr lang="en-US" sz="1100">
-                          <a:solidFill>
-                            <a:schemeClr val="tx1"/>
-                          </a:solidFill>
-                          <a:effectLst/>
-                        </a:rPr>
-                        <a:t>agi_bucket</a:t>
-                      </a:r>
-                      <a:endParaRPr lang="en-US" sz="1100">
-                        <a:solidFill>
-                          <a:schemeClr val="tx1"/>
-                        </a:solidFill>
-                        <a:effectLst/>
-                        <a:latin typeface="Calibri" panose="020F0502020204030204" pitchFamily="34" charset="0"/>
-                        <a:ea typeface="Calibri" panose="020F0502020204030204" pitchFamily="34" charset="0"/>
-                        <a:cs typeface="Times New Roman" panose="02020603050405020304" pitchFamily="18" charset="0"/>
-                      </a:endParaRPr>
-                    </a:p>
-                  </a:txBody>
-                  <a:tcPr marL="68580" marR="68580" marT="0" marB="0" anchor="ctr">
-                    <a:lnL w="12700" cap="flat" cmpd="sng" algn="ctr">
-                      <a:solidFill>
-                        <a:schemeClr val="tx1"/>
-                      </a:solidFill>
-                      <a:prstDash val="solid"/>
-                      <a:round/>
-                      <a:headEnd type="none" w="med" len="med"/>
-                      <a:tailEnd type="none" w="med" len="med"/>
-                    </a:lnL>
-                    <a:lnR w="12700" cap="flat" cmpd="sng" algn="ctr">
-                      <a:solidFill>
-                        <a:schemeClr val="tx1"/>
-                      </a:solidFill>
-                      <a:prstDash val="solid"/>
-                      <a:round/>
-                      <a:headEnd type="none" w="med" len="med"/>
-                      <a:tailEnd type="none" w="med" len="med"/>
-                    </a:lnR>
-                    <a:lnT w="12700" cap="flat" cmpd="sng" algn="ctr">
-                      <a:solidFill>
-                        <a:schemeClr val="tx1"/>
-                      </a:solidFill>
-                      <a:prstDash val="sysDot"/>
-                      <a:round/>
-                      <a:headEnd type="none" w="med" len="med"/>
-                      <a:tailEnd type="none" w="med" len="med"/>
-                    </a:lnT>
-                    <a:lnB w="12700" cap="flat" cmpd="sng" algn="ctr">
-                      <a:solidFill>
-                        <a:schemeClr val="tx1"/>
-                      </a:solidFill>
-                      <a:prstDash val="solid"/>
-                      <a:round/>
-                      <a:headEnd type="none" w="med" len="med"/>
-                      <a:tailEnd type="none" w="med" len="med"/>
-                    </a:lnB>
-                    <a:lnTlToBr w="12700" cmpd="sng">
-                      <a:noFill/>
-                      <a:prstDash val="solid"/>
-                    </a:lnTlToBr>
-                    <a:lnBlToTr w="12700" cmpd="sng">
-                      <a:noFill/>
-                      <a:prstDash val="solid"/>
-                    </a:lnBlToTr>
-                    <a:noFill/>
-                  </a:tcPr>
-                </a:tc>
-                <a:tc>
-                  <a:txBody>
-                    <a:bodyPr/>
-                    <a:lstStyle/>
-                    <a:p>
-                      <a:pPr marL="0" marR="0">
-                        <a:lnSpc>
-                          <a:spcPct val="107000"/>
-                        </a:lnSpc>
-                        <a:spcBef>
-                          <a:spcPts val="0"/>
-                        </a:spcBef>
-                        <a:spcAft>
-                          <a:spcPts val="0"/>
-                        </a:spcAft>
-                      </a:pPr>
-                      <a:r>
-                        <a:rPr lang="en-US" sz="1100" dirty="0">
-                          <a:solidFill>
-                            <a:schemeClr val="tx1"/>
-                          </a:solidFill>
-                          <a:effectLst/>
-                        </a:rPr>
-                        <a:t>0.219</a:t>
-                      </a:r>
-                      <a:endParaRPr lang="en-US" sz="1100" dirty="0">
-                        <a:solidFill>
-                          <a:schemeClr val="tx1"/>
-                        </a:solidFill>
-                        <a:effectLst/>
-                        <a:latin typeface="Calibri" panose="020F0502020204030204" pitchFamily="34" charset="0"/>
-                        <a:ea typeface="Calibri" panose="020F0502020204030204" pitchFamily="34" charset="0"/>
-                        <a:cs typeface="Times New Roman" panose="02020603050405020304" pitchFamily="18" charset="0"/>
-                      </a:endParaRPr>
-                    </a:p>
-                  </a:txBody>
-                  <a:tcPr marL="68580" marR="68580" marT="0" marB="0" anchor="ctr">
-                    <a:lnL w="12700" cap="flat" cmpd="sng" algn="ctr">
-                      <a:solidFill>
-                        <a:schemeClr val="tx1"/>
-                      </a:solidFill>
-                      <a:prstDash val="solid"/>
-                      <a:round/>
-                      <a:headEnd type="none" w="med" len="med"/>
-                      <a:tailEnd type="none" w="med" len="med"/>
-                    </a:lnL>
-                    <a:lnR w="12700" cap="flat" cmpd="sng" algn="ctr">
-                      <a:solidFill>
-                        <a:schemeClr val="tx1"/>
-                      </a:solidFill>
-                      <a:prstDash val="solid"/>
-                      <a:round/>
-                      <a:headEnd type="none" w="med" len="med"/>
-                      <a:tailEnd type="none" w="med" len="med"/>
-                    </a:lnR>
-                    <a:lnT w="12700" cap="flat" cmpd="sng" algn="ctr">
-                      <a:solidFill>
-                        <a:schemeClr val="tx1"/>
-                      </a:solidFill>
-                      <a:prstDash val="sysDot"/>
-                      <a:round/>
-                      <a:headEnd type="none" w="med" len="med"/>
-                      <a:tailEnd type="none" w="med" len="med"/>
-                    </a:lnT>
-                    <a:lnB w="12700" cap="flat" cmpd="sng" algn="ctr">
-                      <a:solidFill>
-                        <a:schemeClr val="tx1"/>
-                      </a:solidFill>
-                      <a:prstDash val="solid"/>
-                      <a:round/>
-                      <a:headEnd type="none" w="med" len="med"/>
-                      <a:tailEnd type="none" w="med" len="med"/>
-                    </a:lnB>
-                    <a:lnTlToBr w="12700" cmpd="sng">
-                      <a:noFill/>
-                      <a:prstDash val="solid"/>
-                    </a:lnTlToBr>
-                    <a:lnBlToTr w="12700" cmpd="sng">
-                      <a:noFill/>
-                      <a:prstDash val="solid"/>
-                    </a:lnBlToTr>
-                    <a:noFill/>
-                  </a:tcPr>
-                </a:tc>
-                <a:extLst>
-                  <a:ext uri="{0D108BD9-81ED-4DB2-BD59-A6C34878D82A}">
-                    <a16:rowId xmlns:a16="http://schemas.microsoft.com/office/drawing/2014/main" val="3838127293"/>
-                  </a:ext>
-                </a:extLst>
-              </a:tr>
-            </a:tbl>
-          </a:graphicData>
-        </a:graphic>
-      </p:graphicFrame>
       <p:pic>
         <p:nvPicPr>
           <p:cNvPr id="15" name="Picture 14" descr="Chart&#10;&#10;Description automatically generated">
@@ -7983,36 +6072,6 @@
           <a:xfrm>
             <a:off x="1112917" y="1981789"/>
             <a:ext cx="2535507" cy="2095966"/>
-          </a:xfrm>
-          <a:prstGeom prst="rect">
-            <a:avLst/>
-          </a:prstGeom>
-        </p:spPr>
-      </p:pic>
-      <p:pic>
-        <p:nvPicPr>
-          <p:cNvPr id="16" name="Picture 15" descr="A picture containing background pattern&#10;&#10;Description automatically generated">
-            <a:extLst>
-              <a:ext uri="{FF2B5EF4-FFF2-40B4-BE49-F238E27FC236}">
-                <a16:creationId xmlns:a16="http://schemas.microsoft.com/office/drawing/2014/main" id="{D1E4C429-2031-B990-5FFD-3A4996551404}"/>
-              </a:ext>
-            </a:extLst>
-          </p:cNvPr>
-          <p:cNvPicPr>
-            <a:picLocks noChangeAspect="1"/>
-          </p:cNvPicPr>
-          <p:nvPr/>
-        </p:nvPicPr>
-        <p:blipFill>
-          <a:blip r:embed="rId3"/>
-          <a:stretch>
-            <a:fillRect/>
-          </a:stretch>
-        </p:blipFill>
-        <p:spPr>
-          <a:xfrm>
-            <a:off x="7838230" y="1981789"/>
-            <a:ext cx="4086113" cy="2478190"/>
           </a:xfrm>
           <a:prstGeom prst="rect">
             <a:avLst/>
@@ -9031,104 +7090,1151 @@
           </a:p>
         </p:txBody>
       </p:sp>
-      <p:sp>
-        <p:nvSpPr>
-          <p:cNvPr id="18" name="Rectangle 17">
+      <p:pic>
+        <p:nvPicPr>
+          <p:cNvPr id="21" name="Picture 20">
             <a:extLst>
               <a:ext uri="{FF2B5EF4-FFF2-40B4-BE49-F238E27FC236}">
-                <a16:creationId xmlns:a16="http://schemas.microsoft.com/office/drawing/2014/main" id="{7D78AFA8-BBD0-F351-7F62-D20C6C4C57F4}"/>
+                <a16:creationId xmlns:a16="http://schemas.microsoft.com/office/drawing/2014/main" id="{D21E7A08-CC94-0A67-FE52-96B91497A4DC}"/>
               </a:ext>
             </a:extLst>
           </p:cNvPr>
-          <p:cNvSpPr/>
+          <p:cNvPicPr>
+            <a:picLocks noChangeAspect="1"/>
+          </p:cNvPicPr>
           <p:nvPr/>
-        </p:nvSpPr>
+        </p:nvPicPr>
+        <p:blipFill>
+          <a:blip r:embed="rId3"/>
+          <a:stretch>
+            <a:fillRect/>
+          </a:stretch>
+        </p:blipFill>
         <p:spPr>
           <a:xfrm>
-            <a:off x="4828223" y="2149464"/>
-            <a:ext cx="2656115" cy="1760616"/>
+            <a:off x="7651440" y="1745182"/>
+            <a:ext cx="4262564" cy="2668463"/>
           </a:xfrm>
           <a:prstGeom prst="rect">
             <a:avLst/>
           </a:prstGeom>
         </p:spPr>
-        <p:style>
-          <a:lnRef idx="2">
-            <a:schemeClr val="accent1">
-              <a:shade val="50000"/>
-            </a:schemeClr>
-          </a:lnRef>
-          <a:fillRef idx="1">
-            <a:schemeClr val="accent1"/>
-          </a:fillRef>
-          <a:effectRef idx="0">
-            <a:schemeClr val="accent1"/>
-          </a:effectRef>
-          <a:fontRef idx="minor">
-            <a:schemeClr val="lt1"/>
-          </a:fontRef>
-        </p:style>
-        <p:txBody>
-          <a:bodyPr rtlCol="0" anchor="ctr"/>
-          <a:lstStyle/>
-          <a:p>
-            <a:pPr algn="ctr"/>
-            <a:r>
-              <a:rPr lang="en-US" dirty="0"/>
-              <a:t>Need to update with full EDA</a:t>
-            </a:r>
-          </a:p>
-        </p:txBody>
-      </p:sp>
-      <p:sp>
-        <p:nvSpPr>
-          <p:cNvPr id="19" name="Rectangle 18">
+      </p:pic>
+      <p:graphicFrame>
+        <p:nvGraphicFramePr>
+          <p:cNvPr id="22" name="Table 21">
             <a:extLst>
               <a:ext uri="{FF2B5EF4-FFF2-40B4-BE49-F238E27FC236}">
-                <a16:creationId xmlns:a16="http://schemas.microsoft.com/office/drawing/2014/main" id="{92E08F16-3A5D-3E72-62A5-C01221667805}"/>
+                <a16:creationId xmlns:a16="http://schemas.microsoft.com/office/drawing/2014/main" id="{762388D4-9617-2404-AFA9-32E4BB22E9AA}"/>
               </a:ext>
             </a:extLst>
           </p:cNvPr>
-          <p:cNvSpPr/>
-          <p:nvPr/>
-        </p:nvSpPr>
-        <p:spPr>
-          <a:xfrm>
-            <a:off x="8971659" y="2149464"/>
-            <a:ext cx="2656115" cy="1760616"/>
-          </a:xfrm>
-          <a:prstGeom prst="rect">
-            <a:avLst/>
-          </a:prstGeom>
-        </p:spPr>
-        <p:style>
-          <a:lnRef idx="2">
-            <a:schemeClr val="accent1">
-              <a:shade val="50000"/>
-            </a:schemeClr>
-          </a:lnRef>
-          <a:fillRef idx="1">
-            <a:schemeClr val="accent1"/>
-          </a:fillRef>
-          <a:effectRef idx="0">
-            <a:schemeClr val="accent1"/>
-          </a:effectRef>
-          <a:fontRef idx="minor">
-            <a:schemeClr val="lt1"/>
-          </a:fontRef>
-        </p:style>
-        <p:txBody>
-          <a:bodyPr rtlCol="0" anchor="ctr"/>
-          <a:lstStyle/>
-          <a:p>
-            <a:pPr algn="ctr"/>
-            <a:r>
-              <a:rPr lang="en-US" dirty="0"/>
-              <a:t>Need to update with full EDA</a:t>
-            </a:r>
-          </a:p>
-        </p:txBody>
-      </p:sp>
+          <p:cNvGraphicFramePr>
+            <a:graphicFrameLocks noGrp="1"/>
+          </p:cNvGraphicFramePr>
+          <p:nvPr>
+            <p:extLst>
+              <p:ext uri="{D42A27DB-BD31-4B8C-83A1-F6EECF244321}">
+                <p14:modId xmlns:p14="http://schemas.microsoft.com/office/powerpoint/2010/main" val="3562680909"/>
+              </p:ext>
+            </p:extLst>
+          </p:nvPr>
+        </p:nvGraphicFramePr>
+        <p:xfrm>
+          <a:off x="4595223" y="1699026"/>
+          <a:ext cx="2895600" cy="2714625"/>
+        </p:xfrm>
+        <a:graphic>
+          <a:graphicData uri="http://schemas.openxmlformats.org/drawingml/2006/table">
+            <a:tbl>
+              <a:tblPr firstRow="1" firstCol="1" bandRow="1">
+                <a:tableStyleId>{5C22544A-7EE6-4342-B048-85BDC9FD1C3A}</a:tableStyleId>
+              </a:tblPr>
+              <a:tblGrid>
+                <a:gridCol w="1447800">
+                  <a:extLst>
+                    <a:ext uri="{9D8B030D-6E8A-4147-A177-3AD203B41FA5}">
+                      <a16:colId xmlns:a16="http://schemas.microsoft.com/office/drawing/2014/main" val="1580786733"/>
+                    </a:ext>
+                  </a:extLst>
+                </a:gridCol>
+                <a:gridCol w="1447800">
+                  <a:extLst>
+                    <a:ext uri="{9D8B030D-6E8A-4147-A177-3AD203B41FA5}">
+                      <a16:colId xmlns:a16="http://schemas.microsoft.com/office/drawing/2014/main" val="77023370"/>
+                    </a:ext>
+                  </a:extLst>
+                </a:gridCol>
+              </a:tblGrid>
+              <a:tr h="177898">
+                <a:tc>
+                  <a:txBody>
+                    <a:bodyPr/>
+                    <a:lstStyle/>
+                    <a:p>
+                      <a:pPr marL="0" marR="0">
+                        <a:lnSpc>
+                          <a:spcPct val="107000"/>
+                        </a:lnSpc>
+                        <a:spcBef>
+                          <a:spcPts val="0"/>
+                        </a:spcBef>
+                        <a:spcAft>
+                          <a:spcPts val="800"/>
+                        </a:spcAft>
+                      </a:pPr>
+                      <a:r>
+                        <a:rPr lang="en-US" sz="1100">
+                          <a:effectLst/>
+                        </a:rPr>
+                        <a:t>Feature</a:t>
+                      </a:r>
+                      <a:endParaRPr lang="en-US" sz="1100">
+                        <a:effectLst/>
+                        <a:latin typeface="Calibri" panose="020F0502020204030204" pitchFamily="34" charset="0"/>
+                        <a:ea typeface="Calibri" panose="020F0502020204030204" pitchFamily="34" charset="0"/>
+                        <a:cs typeface="Times New Roman" panose="02020603050405020304" pitchFamily="18" charset="0"/>
+                      </a:endParaRPr>
+                    </a:p>
+                  </a:txBody>
+                  <a:tcPr marL="68580" marR="68580" marT="9525" marB="0" anchor="ctr"/>
+                </a:tc>
+                <a:tc>
+                  <a:txBody>
+                    <a:bodyPr/>
+                    <a:lstStyle/>
+                    <a:p>
+                      <a:pPr marL="0" marR="0">
+                        <a:lnSpc>
+                          <a:spcPct val="107000"/>
+                        </a:lnSpc>
+                        <a:spcBef>
+                          <a:spcPts val="0"/>
+                        </a:spcBef>
+                        <a:spcAft>
+                          <a:spcPts val="800"/>
+                        </a:spcAft>
+                      </a:pPr>
+                      <a:r>
+                        <a:rPr lang="en-US" sz="1100">
+                          <a:effectLst/>
+                        </a:rPr>
+                        <a:t>Correlation with Price</a:t>
+                      </a:r>
+                      <a:endParaRPr lang="en-US" sz="1100">
+                        <a:effectLst/>
+                        <a:latin typeface="Calibri" panose="020F0502020204030204" pitchFamily="34" charset="0"/>
+                        <a:ea typeface="Calibri" panose="020F0502020204030204" pitchFamily="34" charset="0"/>
+                        <a:cs typeface="Times New Roman" panose="02020603050405020304" pitchFamily="18" charset="0"/>
+                      </a:endParaRPr>
+                    </a:p>
+                  </a:txBody>
+                  <a:tcPr marL="68580" marR="68580" marT="9525" marB="0" anchor="ctr"/>
+                </a:tc>
+                <a:extLst>
+                  <a:ext uri="{0D108BD9-81ED-4DB2-BD59-A6C34878D82A}">
+                    <a16:rowId xmlns:a16="http://schemas.microsoft.com/office/drawing/2014/main" val="4110214514"/>
+                  </a:ext>
+                </a:extLst>
+              </a:tr>
+              <a:tr h="177898">
+                <a:tc>
+                  <a:txBody>
+                    <a:bodyPr/>
+                    <a:lstStyle/>
+                    <a:p>
+                      <a:pPr marL="0" marR="0">
+                        <a:lnSpc>
+                          <a:spcPct val="107000"/>
+                        </a:lnSpc>
+                        <a:spcBef>
+                          <a:spcPts val="0"/>
+                        </a:spcBef>
+                        <a:spcAft>
+                          <a:spcPts val="800"/>
+                        </a:spcAft>
+                      </a:pPr>
+                      <a:r>
+                        <a:rPr lang="en-US" sz="1100">
+                          <a:effectLst/>
+                        </a:rPr>
+                        <a:t>total_credit_amt</a:t>
+                      </a:r>
+                      <a:endParaRPr lang="en-US" sz="1100">
+                        <a:effectLst/>
+                        <a:latin typeface="Calibri" panose="020F0502020204030204" pitchFamily="34" charset="0"/>
+                        <a:ea typeface="Calibri" panose="020F0502020204030204" pitchFamily="34" charset="0"/>
+                        <a:cs typeface="Times New Roman" panose="02020603050405020304" pitchFamily="18" charset="0"/>
+                      </a:endParaRPr>
+                    </a:p>
+                  </a:txBody>
+                  <a:tcPr marL="68580" marR="68580" marT="9525" marB="0" anchor="ctr"/>
+                </a:tc>
+                <a:tc>
+                  <a:txBody>
+                    <a:bodyPr/>
+                    <a:lstStyle/>
+                    <a:p>
+                      <a:pPr marL="0" marR="0">
+                        <a:lnSpc>
+                          <a:spcPct val="107000"/>
+                        </a:lnSpc>
+                        <a:spcBef>
+                          <a:spcPts val="0"/>
+                        </a:spcBef>
+                        <a:spcAft>
+                          <a:spcPts val="800"/>
+                        </a:spcAft>
+                      </a:pPr>
+                      <a:r>
+                        <a:rPr lang="en-US" sz="1100">
+                          <a:effectLst/>
+                        </a:rPr>
+                        <a:t>0.290</a:t>
+                      </a:r>
+                      <a:endParaRPr lang="en-US" sz="1100">
+                        <a:effectLst/>
+                        <a:latin typeface="Calibri" panose="020F0502020204030204" pitchFamily="34" charset="0"/>
+                        <a:ea typeface="Calibri" panose="020F0502020204030204" pitchFamily="34" charset="0"/>
+                        <a:cs typeface="Times New Roman" panose="02020603050405020304" pitchFamily="18" charset="0"/>
+                      </a:endParaRPr>
+                    </a:p>
+                  </a:txBody>
+                  <a:tcPr marL="68580" marR="68580" marT="9525" marB="0" anchor="ctr"/>
+                </a:tc>
+                <a:extLst>
+                  <a:ext uri="{0D108BD9-81ED-4DB2-BD59-A6C34878D82A}">
+                    <a16:rowId xmlns:a16="http://schemas.microsoft.com/office/drawing/2014/main" val="2533899980"/>
+                  </a:ext>
+                </a:extLst>
+              </a:tr>
+              <a:tr h="177898">
+                <a:tc>
+                  <a:txBody>
+                    <a:bodyPr/>
+                    <a:lstStyle/>
+                    <a:p>
+                      <a:pPr marL="0" marR="0">
+                        <a:lnSpc>
+                          <a:spcPct val="107000"/>
+                        </a:lnSpc>
+                        <a:spcBef>
+                          <a:spcPts val="0"/>
+                        </a:spcBef>
+                        <a:spcAft>
+                          <a:spcPts val="800"/>
+                        </a:spcAft>
+                      </a:pPr>
+                      <a:r>
+                        <a:rPr lang="en-US" sz="1100">
+                          <a:effectLst/>
+                        </a:rPr>
+                        <a:t>taxable_income_amt</a:t>
+                      </a:r>
+                      <a:endParaRPr lang="en-US" sz="1100">
+                        <a:effectLst/>
+                        <a:latin typeface="Calibri" panose="020F0502020204030204" pitchFamily="34" charset="0"/>
+                        <a:ea typeface="Calibri" panose="020F0502020204030204" pitchFamily="34" charset="0"/>
+                        <a:cs typeface="Times New Roman" panose="02020603050405020304" pitchFamily="18" charset="0"/>
+                      </a:endParaRPr>
+                    </a:p>
+                  </a:txBody>
+                  <a:tcPr marL="68580" marR="68580" marT="9525" marB="0" anchor="ctr"/>
+                </a:tc>
+                <a:tc>
+                  <a:txBody>
+                    <a:bodyPr/>
+                    <a:lstStyle/>
+                    <a:p>
+                      <a:pPr marL="0" marR="0">
+                        <a:lnSpc>
+                          <a:spcPct val="107000"/>
+                        </a:lnSpc>
+                        <a:spcBef>
+                          <a:spcPts val="0"/>
+                        </a:spcBef>
+                        <a:spcAft>
+                          <a:spcPts val="800"/>
+                        </a:spcAft>
+                      </a:pPr>
+                      <a:r>
+                        <a:rPr lang="en-US" sz="1100">
+                          <a:effectLst/>
+                        </a:rPr>
+                        <a:t>0.375</a:t>
+                      </a:r>
+                      <a:endParaRPr lang="en-US" sz="1100">
+                        <a:effectLst/>
+                        <a:latin typeface="Calibri" panose="020F0502020204030204" pitchFamily="34" charset="0"/>
+                        <a:ea typeface="Calibri" panose="020F0502020204030204" pitchFamily="34" charset="0"/>
+                        <a:cs typeface="Times New Roman" panose="02020603050405020304" pitchFamily="18" charset="0"/>
+                      </a:endParaRPr>
+                    </a:p>
+                  </a:txBody>
+                  <a:tcPr marL="68580" marR="68580" marT="9525" marB="0" anchor="ctr"/>
+                </a:tc>
+                <a:extLst>
+                  <a:ext uri="{0D108BD9-81ED-4DB2-BD59-A6C34878D82A}">
+                    <a16:rowId xmlns:a16="http://schemas.microsoft.com/office/drawing/2014/main" val="1808445841"/>
+                  </a:ext>
+                </a:extLst>
+              </a:tr>
+              <a:tr h="177898">
+                <a:tc>
+                  <a:txBody>
+                    <a:bodyPr/>
+                    <a:lstStyle/>
+                    <a:p>
+                      <a:pPr marL="0" marR="0">
+                        <a:lnSpc>
+                          <a:spcPct val="107000"/>
+                        </a:lnSpc>
+                        <a:spcBef>
+                          <a:spcPts val="0"/>
+                        </a:spcBef>
+                        <a:spcAft>
+                          <a:spcPts val="800"/>
+                        </a:spcAft>
+                      </a:pPr>
+                      <a:r>
+                        <a:rPr lang="en-US" sz="1100">
+                          <a:effectLst/>
+                        </a:rPr>
+                        <a:t>mortgageint_amt</a:t>
+                      </a:r>
+                      <a:endParaRPr lang="en-US" sz="1100">
+                        <a:effectLst/>
+                        <a:latin typeface="Calibri" panose="020F0502020204030204" pitchFamily="34" charset="0"/>
+                        <a:ea typeface="Calibri" panose="020F0502020204030204" pitchFamily="34" charset="0"/>
+                        <a:cs typeface="Times New Roman" panose="02020603050405020304" pitchFamily="18" charset="0"/>
+                      </a:endParaRPr>
+                    </a:p>
+                  </a:txBody>
+                  <a:tcPr marL="68580" marR="68580" marT="9525" marB="0" anchor="ctr"/>
+                </a:tc>
+                <a:tc>
+                  <a:txBody>
+                    <a:bodyPr/>
+                    <a:lstStyle/>
+                    <a:p>
+                      <a:pPr marL="0" marR="0">
+                        <a:lnSpc>
+                          <a:spcPct val="107000"/>
+                        </a:lnSpc>
+                        <a:spcBef>
+                          <a:spcPts val="0"/>
+                        </a:spcBef>
+                        <a:spcAft>
+                          <a:spcPts val="800"/>
+                        </a:spcAft>
+                      </a:pPr>
+                      <a:r>
+                        <a:rPr lang="en-US" sz="1100">
+                          <a:effectLst/>
+                        </a:rPr>
+                        <a:t>0.234</a:t>
+                      </a:r>
+                      <a:endParaRPr lang="en-US" sz="1100">
+                        <a:effectLst/>
+                        <a:latin typeface="Calibri" panose="020F0502020204030204" pitchFamily="34" charset="0"/>
+                        <a:ea typeface="Calibri" panose="020F0502020204030204" pitchFamily="34" charset="0"/>
+                        <a:cs typeface="Times New Roman" panose="02020603050405020304" pitchFamily="18" charset="0"/>
+                      </a:endParaRPr>
+                    </a:p>
+                  </a:txBody>
+                  <a:tcPr marL="68580" marR="68580" marT="9525" marB="0" anchor="ctr"/>
+                </a:tc>
+                <a:extLst>
+                  <a:ext uri="{0D108BD9-81ED-4DB2-BD59-A6C34878D82A}">
+                    <a16:rowId xmlns:a16="http://schemas.microsoft.com/office/drawing/2014/main" val="1175059380"/>
+                  </a:ext>
+                </a:extLst>
+              </a:tr>
+              <a:tr h="177898">
+                <a:tc>
+                  <a:txBody>
+                    <a:bodyPr/>
+                    <a:lstStyle/>
+                    <a:p>
+                      <a:pPr marL="0" marR="0">
+                        <a:lnSpc>
+                          <a:spcPct val="107000"/>
+                        </a:lnSpc>
+                        <a:spcBef>
+                          <a:spcPts val="0"/>
+                        </a:spcBef>
+                        <a:spcAft>
+                          <a:spcPts val="800"/>
+                        </a:spcAft>
+                      </a:pPr>
+                      <a:r>
+                        <a:rPr lang="en-US" sz="1100">
+                          <a:effectLst/>
+                        </a:rPr>
+                        <a:t>p_mortgageint_nr</a:t>
+                      </a:r>
+                      <a:endParaRPr lang="en-US" sz="1100">
+                        <a:effectLst/>
+                        <a:latin typeface="Calibri" panose="020F0502020204030204" pitchFamily="34" charset="0"/>
+                        <a:ea typeface="Calibri" panose="020F0502020204030204" pitchFamily="34" charset="0"/>
+                        <a:cs typeface="Times New Roman" panose="02020603050405020304" pitchFamily="18" charset="0"/>
+                      </a:endParaRPr>
+                    </a:p>
+                  </a:txBody>
+                  <a:tcPr marL="68580" marR="68580" marT="9525" marB="0" anchor="ctr"/>
+                </a:tc>
+                <a:tc>
+                  <a:txBody>
+                    <a:bodyPr/>
+                    <a:lstStyle/>
+                    <a:p>
+                      <a:pPr marL="0" marR="0">
+                        <a:lnSpc>
+                          <a:spcPct val="107000"/>
+                        </a:lnSpc>
+                        <a:spcBef>
+                          <a:spcPts val="0"/>
+                        </a:spcBef>
+                        <a:spcAft>
+                          <a:spcPts val="800"/>
+                        </a:spcAft>
+                      </a:pPr>
+                      <a:r>
+                        <a:rPr lang="en-US" sz="1100">
+                          <a:effectLst/>
+                        </a:rPr>
+                        <a:t>0.024</a:t>
+                      </a:r>
+                      <a:endParaRPr lang="en-US" sz="1100">
+                        <a:effectLst/>
+                        <a:latin typeface="Calibri" panose="020F0502020204030204" pitchFamily="34" charset="0"/>
+                        <a:ea typeface="Calibri" panose="020F0502020204030204" pitchFamily="34" charset="0"/>
+                        <a:cs typeface="Times New Roman" panose="02020603050405020304" pitchFamily="18" charset="0"/>
+                      </a:endParaRPr>
+                    </a:p>
+                  </a:txBody>
+                  <a:tcPr marL="68580" marR="68580" marT="9525" marB="0" anchor="ctr"/>
+                </a:tc>
+                <a:extLst>
+                  <a:ext uri="{0D108BD9-81ED-4DB2-BD59-A6C34878D82A}">
+                    <a16:rowId xmlns:a16="http://schemas.microsoft.com/office/drawing/2014/main" val="3264610848"/>
+                  </a:ext>
+                </a:extLst>
+              </a:tr>
+              <a:tr h="177898">
+                <a:tc>
+                  <a:txBody>
+                    <a:bodyPr/>
+                    <a:lstStyle/>
+                    <a:p>
+                      <a:pPr marL="0" marR="0">
+                        <a:lnSpc>
+                          <a:spcPct val="107000"/>
+                        </a:lnSpc>
+                        <a:spcBef>
+                          <a:spcPts val="0"/>
+                        </a:spcBef>
+                        <a:spcAft>
+                          <a:spcPts val="800"/>
+                        </a:spcAft>
+                      </a:pPr>
+                      <a:r>
+                        <a:rPr lang="en-US" sz="1100">
+                          <a:effectLst/>
+                        </a:rPr>
+                        <a:t>inctax_amt</a:t>
+                      </a:r>
+                      <a:endParaRPr lang="en-US" sz="1100">
+                        <a:effectLst/>
+                        <a:latin typeface="Calibri" panose="020F0502020204030204" pitchFamily="34" charset="0"/>
+                        <a:ea typeface="Calibri" panose="020F0502020204030204" pitchFamily="34" charset="0"/>
+                        <a:cs typeface="Times New Roman" panose="02020603050405020304" pitchFamily="18" charset="0"/>
+                      </a:endParaRPr>
+                    </a:p>
+                  </a:txBody>
+                  <a:tcPr marL="68580" marR="68580" marT="9525" marB="0" anchor="ctr"/>
+                </a:tc>
+                <a:tc>
+                  <a:txBody>
+                    <a:bodyPr/>
+                    <a:lstStyle/>
+                    <a:p>
+                      <a:pPr marL="0" marR="0">
+                        <a:lnSpc>
+                          <a:spcPct val="107000"/>
+                        </a:lnSpc>
+                        <a:spcBef>
+                          <a:spcPts val="0"/>
+                        </a:spcBef>
+                        <a:spcAft>
+                          <a:spcPts val="800"/>
+                        </a:spcAft>
+                      </a:pPr>
+                      <a:r>
+                        <a:rPr lang="en-US" sz="1100" dirty="0">
+                          <a:effectLst/>
+                        </a:rPr>
+                        <a:t>0.378</a:t>
+                      </a:r>
+                      <a:endParaRPr lang="en-US" sz="1100" dirty="0">
+                        <a:effectLst/>
+                        <a:latin typeface="Calibri" panose="020F0502020204030204" pitchFamily="34" charset="0"/>
+                        <a:ea typeface="Calibri" panose="020F0502020204030204" pitchFamily="34" charset="0"/>
+                        <a:cs typeface="Times New Roman" panose="02020603050405020304" pitchFamily="18" charset="0"/>
+                      </a:endParaRPr>
+                    </a:p>
+                  </a:txBody>
+                  <a:tcPr marL="68580" marR="68580" marT="9525" marB="0" anchor="ctr"/>
+                </a:tc>
+                <a:extLst>
+                  <a:ext uri="{0D108BD9-81ED-4DB2-BD59-A6C34878D82A}">
+                    <a16:rowId xmlns:a16="http://schemas.microsoft.com/office/drawing/2014/main" val="1703724021"/>
+                  </a:ext>
+                </a:extLst>
+              </a:tr>
+              <a:tr h="177898">
+                <a:tc>
+                  <a:txBody>
+                    <a:bodyPr/>
+                    <a:lstStyle/>
+                    <a:p>
+                      <a:pPr marL="0" marR="0">
+                        <a:lnSpc>
+                          <a:spcPct val="107000"/>
+                        </a:lnSpc>
+                        <a:spcBef>
+                          <a:spcPts val="0"/>
+                        </a:spcBef>
+                        <a:spcAft>
+                          <a:spcPts val="800"/>
+                        </a:spcAft>
+                      </a:pPr>
+                      <a:r>
+                        <a:rPr lang="en-US" sz="1100">
+                          <a:effectLst/>
+                        </a:rPr>
+                        <a:t>p_unemploy_nr</a:t>
+                      </a:r>
+                      <a:endParaRPr lang="en-US" sz="1100">
+                        <a:effectLst/>
+                        <a:latin typeface="Calibri" panose="020F0502020204030204" pitchFamily="34" charset="0"/>
+                        <a:ea typeface="Calibri" panose="020F0502020204030204" pitchFamily="34" charset="0"/>
+                        <a:cs typeface="Times New Roman" panose="02020603050405020304" pitchFamily="18" charset="0"/>
+                      </a:endParaRPr>
+                    </a:p>
+                  </a:txBody>
+                  <a:tcPr marL="68580" marR="68580" marT="9525" marB="0" anchor="ctr"/>
+                </a:tc>
+                <a:tc>
+                  <a:txBody>
+                    <a:bodyPr/>
+                    <a:lstStyle/>
+                    <a:p>
+                      <a:pPr marL="0" marR="0">
+                        <a:lnSpc>
+                          <a:spcPct val="107000"/>
+                        </a:lnSpc>
+                        <a:spcBef>
+                          <a:spcPts val="0"/>
+                        </a:spcBef>
+                        <a:spcAft>
+                          <a:spcPts val="800"/>
+                        </a:spcAft>
+                      </a:pPr>
+                      <a:r>
+                        <a:rPr lang="en-US" sz="1100">
+                          <a:effectLst/>
+                        </a:rPr>
+                        <a:t>-0.215</a:t>
+                      </a:r>
+                      <a:endParaRPr lang="en-US" sz="1100">
+                        <a:effectLst/>
+                        <a:latin typeface="Calibri" panose="020F0502020204030204" pitchFamily="34" charset="0"/>
+                        <a:ea typeface="Calibri" panose="020F0502020204030204" pitchFamily="34" charset="0"/>
+                        <a:cs typeface="Times New Roman" panose="02020603050405020304" pitchFamily="18" charset="0"/>
+                      </a:endParaRPr>
+                    </a:p>
+                  </a:txBody>
+                  <a:tcPr marL="68580" marR="68580" marT="9525" marB="0" anchor="ctr"/>
+                </a:tc>
+                <a:extLst>
+                  <a:ext uri="{0D108BD9-81ED-4DB2-BD59-A6C34878D82A}">
+                    <a16:rowId xmlns:a16="http://schemas.microsoft.com/office/drawing/2014/main" val="1376028326"/>
+                  </a:ext>
+                </a:extLst>
+              </a:tr>
+              <a:tr h="177898">
+                <a:tc>
+                  <a:txBody>
+                    <a:bodyPr/>
+                    <a:lstStyle/>
+                    <a:p>
+                      <a:pPr marL="0" marR="0">
+                        <a:lnSpc>
+                          <a:spcPct val="107000"/>
+                        </a:lnSpc>
+                        <a:spcBef>
+                          <a:spcPts val="0"/>
+                        </a:spcBef>
+                        <a:spcAft>
+                          <a:spcPts val="800"/>
+                        </a:spcAft>
+                      </a:pPr>
+                      <a:r>
+                        <a:rPr lang="en-US" sz="1100">
+                          <a:effectLst/>
+                        </a:rPr>
+                        <a:t>agi_amt</a:t>
+                      </a:r>
+                      <a:endParaRPr lang="en-US" sz="1100">
+                        <a:effectLst/>
+                        <a:latin typeface="Calibri" panose="020F0502020204030204" pitchFamily="34" charset="0"/>
+                        <a:ea typeface="Calibri" panose="020F0502020204030204" pitchFamily="34" charset="0"/>
+                        <a:cs typeface="Times New Roman" panose="02020603050405020304" pitchFamily="18" charset="0"/>
+                      </a:endParaRPr>
+                    </a:p>
+                  </a:txBody>
+                  <a:tcPr marL="68580" marR="68580" marT="9525" marB="0" anchor="ctr"/>
+                </a:tc>
+                <a:tc>
+                  <a:txBody>
+                    <a:bodyPr/>
+                    <a:lstStyle/>
+                    <a:p>
+                      <a:pPr marL="0" marR="0">
+                        <a:lnSpc>
+                          <a:spcPct val="107000"/>
+                        </a:lnSpc>
+                        <a:spcBef>
+                          <a:spcPts val="0"/>
+                        </a:spcBef>
+                        <a:spcAft>
+                          <a:spcPts val="800"/>
+                        </a:spcAft>
+                      </a:pPr>
+                      <a:r>
+                        <a:rPr lang="en-US" sz="1100">
+                          <a:effectLst/>
+                        </a:rPr>
+                        <a:t>0.372</a:t>
+                      </a:r>
+                      <a:endParaRPr lang="en-US" sz="1100">
+                        <a:effectLst/>
+                        <a:latin typeface="Calibri" panose="020F0502020204030204" pitchFamily="34" charset="0"/>
+                        <a:ea typeface="Calibri" panose="020F0502020204030204" pitchFamily="34" charset="0"/>
+                        <a:cs typeface="Times New Roman" panose="02020603050405020304" pitchFamily="18" charset="0"/>
+                      </a:endParaRPr>
+                    </a:p>
+                  </a:txBody>
+                  <a:tcPr marL="68580" marR="68580" marT="9525" marB="0" anchor="ctr"/>
+                </a:tc>
+                <a:extLst>
+                  <a:ext uri="{0D108BD9-81ED-4DB2-BD59-A6C34878D82A}">
+                    <a16:rowId xmlns:a16="http://schemas.microsoft.com/office/drawing/2014/main" val="2048139425"/>
+                  </a:ext>
+                </a:extLst>
+              </a:tr>
+              <a:tr h="177898">
+                <a:tc>
+                  <a:txBody>
+                    <a:bodyPr/>
+                    <a:lstStyle/>
+                    <a:p>
+                      <a:pPr marL="0" marR="0">
+                        <a:lnSpc>
+                          <a:spcPct val="107000"/>
+                        </a:lnSpc>
+                        <a:spcBef>
+                          <a:spcPts val="0"/>
+                        </a:spcBef>
+                        <a:spcAft>
+                          <a:spcPts val="800"/>
+                        </a:spcAft>
+                      </a:pPr>
+                      <a:r>
+                        <a:rPr lang="en-US" sz="1100">
+                          <a:effectLst/>
+                        </a:rPr>
+                        <a:t>num_dependents</a:t>
+                      </a:r>
+                      <a:endParaRPr lang="en-US" sz="1100">
+                        <a:effectLst/>
+                        <a:latin typeface="Calibri" panose="020F0502020204030204" pitchFamily="34" charset="0"/>
+                        <a:ea typeface="Calibri" panose="020F0502020204030204" pitchFamily="34" charset="0"/>
+                        <a:cs typeface="Times New Roman" panose="02020603050405020304" pitchFamily="18" charset="0"/>
+                      </a:endParaRPr>
+                    </a:p>
+                  </a:txBody>
+                  <a:tcPr marL="68580" marR="68580" marT="9525" marB="0" anchor="ctr"/>
+                </a:tc>
+                <a:tc>
+                  <a:txBody>
+                    <a:bodyPr/>
+                    <a:lstStyle/>
+                    <a:p>
+                      <a:pPr marL="0" marR="0">
+                        <a:lnSpc>
+                          <a:spcPct val="107000"/>
+                        </a:lnSpc>
+                        <a:spcBef>
+                          <a:spcPts val="0"/>
+                        </a:spcBef>
+                        <a:spcAft>
+                          <a:spcPts val="800"/>
+                        </a:spcAft>
+                      </a:pPr>
+                      <a:r>
+                        <a:rPr lang="en-US" sz="1100">
+                          <a:effectLst/>
+                        </a:rPr>
+                        <a:t>-0.179</a:t>
+                      </a:r>
+                      <a:endParaRPr lang="en-US" sz="1100">
+                        <a:effectLst/>
+                        <a:latin typeface="Calibri" panose="020F0502020204030204" pitchFamily="34" charset="0"/>
+                        <a:ea typeface="Calibri" panose="020F0502020204030204" pitchFamily="34" charset="0"/>
+                        <a:cs typeface="Times New Roman" panose="02020603050405020304" pitchFamily="18" charset="0"/>
+                      </a:endParaRPr>
+                    </a:p>
+                  </a:txBody>
+                  <a:tcPr marL="68580" marR="68580" marT="9525" marB="0" anchor="ctr"/>
+                </a:tc>
+                <a:extLst>
+                  <a:ext uri="{0D108BD9-81ED-4DB2-BD59-A6C34878D82A}">
+                    <a16:rowId xmlns:a16="http://schemas.microsoft.com/office/drawing/2014/main" val="1909454832"/>
+                  </a:ext>
+                </a:extLst>
+              </a:tr>
+              <a:tr h="177898">
+                <a:tc>
+                  <a:txBody>
+                    <a:bodyPr/>
+                    <a:lstStyle/>
+                    <a:p>
+                      <a:pPr marL="0" marR="0">
+                        <a:lnSpc>
+                          <a:spcPct val="107000"/>
+                        </a:lnSpc>
+                        <a:spcBef>
+                          <a:spcPts val="0"/>
+                        </a:spcBef>
+                        <a:spcAft>
+                          <a:spcPts val="800"/>
+                        </a:spcAft>
+                      </a:pPr>
+                      <a:r>
+                        <a:rPr lang="en-US" sz="1100">
+                          <a:effectLst/>
+                        </a:rPr>
+                        <a:t>p_re_taxes_nr</a:t>
+                      </a:r>
+                      <a:endParaRPr lang="en-US" sz="1100">
+                        <a:effectLst/>
+                        <a:latin typeface="Calibri" panose="020F0502020204030204" pitchFamily="34" charset="0"/>
+                        <a:ea typeface="Calibri" panose="020F0502020204030204" pitchFamily="34" charset="0"/>
+                        <a:cs typeface="Times New Roman" panose="02020603050405020304" pitchFamily="18" charset="0"/>
+                      </a:endParaRPr>
+                    </a:p>
+                  </a:txBody>
+                  <a:tcPr marL="68580" marR="68580" marT="9525" marB="0" anchor="ctr"/>
+                </a:tc>
+                <a:tc>
+                  <a:txBody>
+                    <a:bodyPr/>
+                    <a:lstStyle/>
+                    <a:p>
+                      <a:pPr marL="0" marR="0">
+                        <a:lnSpc>
+                          <a:spcPct val="107000"/>
+                        </a:lnSpc>
+                        <a:spcBef>
+                          <a:spcPts val="0"/>
+                        </a:spcBef>
+                        <a:spcAft>
+                          <a:spcPts val="800"/>
+                        </a:spcAft>
+                      </a:pPr>
+                      <a:r>
+                        <a:rPr lang="en-US" sz="1100">
+                          <a:effectLst/>
+                        </a:rPr>
+                        <a:t>0.046</a:t>
+                      </a:r>
+                      <a:endParaRPr lang="en-US" sz="1100">
+                        <a:effectLst/>
+                        <a:latin typeface="Calibri" panose="020F0502020204030204" pitchFamily="34" charset="0"/>
+                        <a:ea typeface="Calibri" panose="020F0502020204030204" pitchFamily="34" charset="0"/>
+                        <a:cs typeface="Times New Roman" panose="02020603050405020304" pitchFamily="18" charset="0"/>
+                      </a:endParaRPr>
+                    </a:p>
+                  </a:txBody>
+                  <a:tcPr marL="68580" marR="68580" marT="9525" marB="0" anchor="ctr"/>
+                </a:tc>
+                <a:extLst>
+                  <a:ext uri="{0D108BD9-81ED-4DB2-BD59-A6C34878D82A}">
+                    <a16:rowId xmlns:a16="http://schemas.microsoft.com/office/drawing/2014/main" val="867211640"/>
+                  </a:ext>
+                </a:extLst>
+              </a:tr>
+              <a:tr h="177898">
+                <a:tc>
+                  <a:txBody>
+                    <a:bodyPr/>
+                    <a:lstStyle/>
+                    <a:p>
+                      <a:pPr marL="0" marR="0">
+                        <a:lnSpc>
+                          <a:spcPct val="107000"/>
+                        </a:lnSpc>
+                        <a:spcBef>
+                          <a:spcPts val="0"/>
+                        </a:spcBef>
+                        <a:spcAft>
+                          <a:spcPts val="800"/>
+                        </a:spcAft>
+                      </a:pPr>
+                      <a:r>
+                        <a:rPr lang="en-US" sz="1100">
+                          <a:effectLst/>
+                        </a:rPr>
+                        <a:t>agi_bucket</a:t>
+                      </a:r>
+                      <a:endParaRPr lang="en-US" sz="1100">
+                        <a:effectLst/>
+                        <a:latin typeface="Calibri" panose="020F0502020204030204" pitchFamily="34" charset="0"/>
+                        <a:ea typeface="Calibri" panose="020F0502020204030204" pitchFamily="34" charset="0"/>
+                        <a:cs typeface="Times New Roman" panose="02020603050405020304" pitchFamily="18" charset="0"/>
+                      </a:endParaRPr>
+                    </a:p>
+                  </a:txBody>
+                  <a:tcPr marL="68580" marR="68580" marT="9525" marB="0" anchor="ctr"/>
+                </a:tc>
+                <a:tc>
+                  <a:txBody>
+                    <a:bodyPr/>
+                    <a:lstStyle/>
+                    <a:p>
+                      <a:pPr marL="0" marR="0">
+                        <a:lnSpc>
+                          <a:spcPct val="107000"/>
+                        </a:lnSpc>
+                        <a:spcBef>
+                          <a:spcPts val="0"/>
+                        </a:spcBef>
+                        <a:spcAft>
+                          <a:spcPts val="800"/>
+                        </a:spcAft>
+                      </a:pPr>
+                      <a:r>
+                        <a:rPr lang="en-US" sz="1100">
+                          <a:effectLst/>
+                        </a:rPr>
+                        <a:t>0.278</a:t>
+                      </a:r>
+                      <a:endParaRPr lang="en-US" sz="1100">
+                        <a:effectLst/>
+                        <a:latin typeface="Calibri" panose="020F0502020204030204" pitchFamily="34" charset="0"/>
+                        <a:ea typeface="Calibri" panose="020F0502020204030204" pitchFamily="34" charset="0"/>
+                        <a:cs typeface="Times New Roman" panose="02020603050405020304" pitchFamily="18" charset="0"/>
+                      </a:endParaRPr>
+                    </a:p>
+                  </a:txBody>
+                  <a:tcPr marL="68580" marR="68580" marT="9525" marB="0" anchor="ctr"/>
+                </a:tc>
+                <a:extLst>
+                  <a:ext uri="{0D108BD9-81ED-4DB2-BD59-A6C34878D82A}">
+                    <a16:rowId xmlns:a16="http://schemas.microsoft.com/office/drawing/2014/main" val="445709430"/>
+                  </a:ext>
+                </a:extLst>
+              </a:tr>
+              <a:tr h="177898">
+                <a:tc>
+                  <a:txBody>
+                    <a:bodyPr/>
+                    <a:lstStyle/>
+                    <a:p>
+                      <a:pPr marL="0" marR="0">
+                        <a:lnSpc>
+                          <a:spcPct val="107000"/>
+                        </a:lnSpc>
+                        <a:spcBef>
+                          <a:spcPts val="0"/>
+                        </a:spcBef>
+                        <a:spcAft>
+                          <a:spcPts val="800"/>
+                        </a:spcAft>
+                      </a:pPr>
+                      <a:r>
+                        <a:rPr lang="en-US" sz="1100">
+                          <a:effectLst/>
+                        </a:rPr>
+                        <a:t>bed</a:t>
+                      </a:r>
+                      <a:endParaRPr lang="en-US" sz="1100">
+                        <a:effectLst/>
+                        <a:latin typeface="Calibri" panose="020F0502020204030204" pitchFamily="34" charset="0"/>
+                        <a:ea typeface="Calibri" panose="020F0502020204030204" pitchFamily="34" charset="0"/>
+                        <a:cs typeface="Times New Roman" panose="02020603050405020304" pitchFamily="18" charset="0"/>
+                      </a:endParaRPr>
+                    </a:p>
+                  </a:txBody>
+                  <a:tcPr marL="68580" marR="68580" marT="9525" marB="0" anchor="ctr"/>
+                </a:tc>
+                <a:tc>
+                  <a:txBody>
+                    <a:bodyPr/>
+                    <a:lstStyle/>
+                    <a:p>
+                      <a:pPr marL="0" marR="0">
+                        <a:lnSpc>
+                          <a:spcPct val="107000"/>
+                        </a:lnSpc>
+                        <a:spcBef>
+                          <a:spcPts val="0"/>
+                        </a:spcBef>
+                        <a:spcAft>
+                          <a:spcPts val="800"/>
+                        </a:spcAft>
+                      </a:pPr>
+                      <a:r>
+                        <a:rPr lang="en-US" sz="1100">
+                          <a:effectLst/>
+                        </a:rPr>
+                        <a:t>0.218</a:t>
+                      </a:r>
+                      <a:endParaRPr lang="en-US" sz="1100">
+                        <a:effectLst/>
+                        <a:latin typeface="Calibri" panose="020F0502020204030204" pitchFamily="34" charset="0"/>
+                        <a:ea typeface="Calibri" panose="020F0502020204030204" pitchFamily="34" charset="0"/>
+                        <a:cs typeface="Times New Roman" panose="02020603050405020304" pitchFamily="18" charset="0"/>
+                      </a:endParaRPr>
+                    </a:p>
+                  </a:txBody>
+                  <a:tcPr marL="68580" marR="68580" marT="9525" marB="0" anchor="ctr"/>
+                </a:tc>
+                <a:extLst>
+                  <a:ext uri="{0D108BD9-81ED-4DB2-BD59-A6C34878D82A}">
+                    <a16:rowId xmlns:a16="http://schemas.microsoft.com/office/drawing/2014/main" val="2897392378"/>
+                  </a:ext>
+                </a:extLst>
+              </a:tr>
+              <a:tr h="177898">
+                <a:tc>
+                  <a:txBody>
+                    <a:bodyPr/>
+                    <a:lstStyle/>
+                    <a:p>
+                      <a:pPr marL="0" marR="0">
+                        <a:lnSpc>
+                          <a:spcPct val="107000"/>
+                        </a:lnSpc>
+                        <a:spcBef>
+                          <a:spcPts val="0"/>
+                        </a:spcBef>
+                        <a:spcAft>
+                          <a:spcPts val="800"/>
+                        </a:spcAft>
+                      </a:pPr>
+                      <a:r>
+                        <a:rPr lang="en-US" sz="1100">
+                          <a:effectLst/>
+                        </a:rPr>
+                        <a:t>house_size</a:t>
+                      </a:r>
+                      <a:endParaRPr lang="en-US" sz="1100">
+                        <a:effectLst/>
+                        <a:latin typeface="Calibri" panose="020F0502020204030204" pitchFamily="34" charset="0"/>
+                        <a:ea typeface="Calibri" panose="020F0502020204030204" pitchFamily="34" charset="0"/>
+                        <a:cs typeface="Times New Roman" panose="02020603050405020304" pitchFamily="18" charset="0"/>
+                      </a:endParaRPr>
+                    </a:p>
+                  </a:txBody>
+                  <a:tcPr marL="68580" marR="68580" marT="9525" marB="0" anchor="ctr"/>
+                </a:tc>
+                <a:tc>
+                  <a:txBody>
+                    <a:bodyPr/>
+                    <a:lstStyle/>
+                    <a:p>
+                      <a:pPr marL="0" marR="0">
+                        <a:lnSpc>
+                          <a:spcPct val="107000"/>
+                        </a:lnSpc>
+                        <a:spcBef>
+                          <a:spcPts val="0"/>
+                        </a:spcBef>
+                        <a:spcAft>
+                          <a:spcPts val="800"/>
+                        </a:spcAft>
+                      </a:pPr>
+                      <a:r>
+                        <a:rPr lang="en-US" sz="1100">
+                          <a:effectLst/>
+                        </a:rPr>
+                        <a:t>0.395</a:t>
+                      </a:r>
+                      <a:endParaRPr lang="en-US" sz="1100">
+                        <a:effectLst/>
+                        <a:latin typeface="Calibri" panose="020F0502020204030204" pitchFamily="34" charset="0"/>
+                        <a:ea typeface="Calibri" panose="020F0502020204030204" pitchFamily="34" charset="0"/>
+                        <a:cs typeface="Times New Roman" panose="02020603050405020304" pitchFamily="18" charset="0"/>
+                      </a:endParaRPr>
+                    </a:p>
+                  </a:txBody>
+                  <a:tcPr marL="68580" marR="68580" marT="9525" marB="0" anchor="ctr"/>
+                </a:tc>
+                <a:extLst>
+                  <a:ext uri="{0D108BD9-81ED-4DB2-BD59-A6C34878D82A}">
+                    <a16:rowId xmlns:a16="http://schemas.microsoft.com/office/drawing/2014/main" val="2649938384"/>
+                  </a:ext>
+                </a:extLst>
+              </a:tr>
+              <a:tr h="177898">
+                <a:tc>
+                  <a:txBody>
+                    <a:bodyPr/>
+                    <a:lstStyle/>
+                    <a:p>
+                      <a:pPr marL="0" marR="0">
+                        <a:lnSpc>
+                          <a:spcPct val="107000"/>
+                        </a:lnSpc>
+                        <a:spcBef>
+                          <a:spcPts val="0"/>
+                        </a:spcBef>
+                        <a:spcAft>
+                          <a:spcPts val="800"/>
+                        </a:spcAft>
+                      </a:pPr>
+                      <a:r>
+                        <a:rPr lang="en-US" sz="1100">
+                          <a:effectLst/>
+                        </a:rPr>
+                        <a:t>house_acre_lot</a:t>
+                      </a:r>
+                      <a:endParaRPr lang="en-US" sz="1100">
+                        <a:effectLst/>
+                        <a:latin typeface="Calibri" panose="020F0502020204030204" pitchFamily="34" charset="0"/>
+                        <a:ea typeface="Calibri" panose="020F0502020204030204" pitchFamily="34" charset="0"/>
+                        <a:cs typeface="Times New Roman" panose="02020603050405020304" pitchFamily="18" charset="0"/>
+                      </a:endParaRPr>
+                    </a:p>
+                  </a:txBody>
+                  <a:tcPr marL="68580" marR="68580" marT="9525" marB="0" anchor="ctr"/>
+                </a:tc>
+                <a:tc>
+                  <a:txBody>
+                    <a:bodyPr/>
+                    <a:lstStyle/>
+                    <a:p>
+                      <a:pPr marL="0" marR="0">
+                        <a:lnSpc>
+                          <a:spcPct val="107000"/>
+                        </a:lnSpc>
+                        <a:spcBef>
+                          <a:spcPts val="0"/>
+                        </a:spcBef>
+                        <a:spcAft>
+                          <a:spcPts val="800"/>
+                        </a:spcAft>
+                      </a:pPr>
+                      <a:r>
+                        <a:rPr lang="en-US" sz="1100">
+                          <a:effectLst/>
+                        </a:rPr>
+                        <a:t>0.030</a:t>
+                      </a:r>
+                      <a:endParaRPr lang="en-US" sz="1100">
+                        <a:effectLst/>
+                        <a:latin typeface="Calibri" panose="020F0502020204030204" pitchFamily="34" charset="0"/>
+                        <a:ea typeface="Calibri" panose="020F0502020204030204" pitchFamily="34" charset="0"/>
+                        <a:cs typeface="Times New Roman" panose="02020603050405020304" pitchFamily="18" charset="0"/>
+                      </a:endParaRPr>
+                    </a:p>
+                  </a:txBody>
+                  <a:tcPr marL="68580" marR="68580" marT="9525" marB="0" anchor="ctr"/>
+                </a:tc>
+                <a:extLst>
+                  <a:ext uri="{0D108BD9-81ED-4DB2-BD59-A6C34878D82A}">
+                    <a16:rowId xmlns:a16="http://schemas.microsoft.com/office/drawing/2014/main" val="3723889635"/>
+                  </a:ext>
+                </a:extLst>
+              </a:tr>
+              <a:tr h="177898">
+                <a:tc>
+                  <a:txBody>
+                    <a:bodyPr/>
+                    <a:lstStyle/>
+                    <a:p>
+                      <a:pPr marL="0" marR="0">
+                        <a:lnSpc>
+                          <a:spcPct val="107000"/>
+                        </a:lnSpc>
+                        <a:spcBef>
+                          <a:spcPts val="0"/>
+                        </a:spcBef>
+                        <a:spcAft>
+                          <a:spcPts val="800"/>
+                        </a:spcAft>
+                      </a:pPr>
+                      <a:r>
+                        <a:rPr lang="en-US" sz="1100">
+                          <a:effectLst/>
+                        </a:rPr>
+                        <a:t>bath</a:t>
+                      </a:r>
+                      <a:endParaRPr lang="en-US" sz="1100">
+                        <a:effectLst/>
+                        <a:latin typeface="Calibri" panose="020F0502020204030204" pitchFamily="34" charset="0"/>
+                        <a:ea typeface="Calibri" panose="020F0502020204030204" pitchFamily="34" charset="0"/>
+                        <a:cs typeface="Times New Roman" panose="02020603050405020304" pitchFamily="18" charset="0"/>
+                      </a:endParaRPr>
+                    </a:p>
+                  </a:txBody>
+                  <a:tcPr marL="68580" marR="68580" marT="9525" marB="0" anchor="ctr"/>
+                </a:tc>
+                <a:tc>
+                  <a:txBody>
+                    <a:bodyPr/>
+                    <a:lstStyle/>
+                    <a:p>
+                      <a:pPr marL="0" marR="0">
+                        <a:lnSpc>
+                          <a:spcPct val="107000"/>
+                        </a:lnSpc>
+                        <a:spcBef>
+                          <a:spcPts val="0"/>
+                        </a:spcBef>
+                        <a:spcAft>
+                          <a:spcPts val="800"/>
+                        </a:spcAft>
+                      </a:pPr>
+                      <a:r>
+                        <a:rPr lang="en-US" sz="1100" dirty="0">
+                          <a:effectLst/>
+                        </a:rPr>
+                        <a:t>0.490</a:t>
+                      </a:r>
+                      <a:endParaRPr lang="en-US" sz="1100" dirty="0">
+                        <a:effectLst/>
+                        <a:latin typeface="Calibri" panose="020F0502020204030204" pitchFamily="34" charset="0"/>
+                        <a:ea typeface="Calibri" panose="020F0502020204030204" pitchFamily="34" charset="0"/>
+                        <a:cs typeface="Times New Roman" panose="02020603050405020304" pitchFamily="18" charset="0"/>
+                      </a:endParaRPr>
+                    </a:p>
+                  </a:txBody>
+                  <a:tcPr marL="68580" marR="68580" marT="9525" marB="0" anchor="ctr"/>
+                </a:tc>
+                <a:extLst>
+                  <a:ext uri="{0D108BD9-81ED-4DB2-BD59-A6C34878D82A}">
+                    <a16:rowId xmlns:a16="http://schemas.microsoft.com/office/drawing/2014/main" val="2031659125"/>
+                  </a:ext>
+                </a:extLst>
+              </a:tr>
+            </a:tbl>
+          </a:graphicData>
+        </a:graphic>
+      </p:graphicFrame>
     </p:spTree>
     <p:extLst>
       <p:ext uri="{BB962C8B-B14F-4D97-AF65-F5344CB8AC3E}">

</xml_diff>